<commit_message>
[disease outbreak] remove extra medical response
</commit_message>
<xml_diff>
--- a/hrf/disease_outbreak.pptx
+++ b/hrf/disease_outbreak.pptx
@@ -5,7 +5,7 @@
     <p:sldMasterId id="2147483648" r:id="rId1"/>
   </p:sldMasterIdLst>
   <p:notesMasterIdLst>
-    <p:notesMasterId r:id="rId15"/>
+    <p:notesMasterId r:id="rId14"/>
   </p:notesMasterIdLst>
   <p:sldIdLst>
     <p:sldId id="256" r:id="rId2"/>
@@ -13,14 +13,13 @@
     <p:sldId id="258" r:id="rId4"/>
     <p:sldId id="270" r:id="rId5"/>
     <p:sldId id="268" r:id="rId6"/>
-    <p:sldId id="261" r:id="rId7"/>
-    <p:sldId id="271" r:id="rId8"/>
-    <p:sldId id="260" r:id="rId9"/>
-    <p:sldId id="262" r:id="rId10"/>
-    <p:sldId id="263" r:id="rId11"/>
-    <p:sldId id="264" r:id="rId12"/>
-    <p:sldId id="265" r:id="rId13"/>
-    <p:sldId id="269" r:id="rId14"/>
+    <p:sldId id="272" r:id="rId7"/>
+    <p:sldId id="261" r:id="rId8"/>
+    <p:sldId id="262" r:id="rId9"/>
+    <p:sldId id="263" r:id="rId10"/>
+    <p:sldId id="264" r:id="rId11"/>
+    <p:sldId id="265" r:id="rId12"/>
+    <p:sldId id="269" r:id="rId13"/>
   </p:sldIdLst>
   <p:sldSz cx="9144000" cy="5143500" type="screen16x9"/>
   <p:notesSz cx="6858000" cy="9144000"/>
@@ -269,7 +268,7 @@
       </p15:sldGuideLst>
     </p:ext>
     <p:ext uri="http://customooxmlschemas.google.com/">
-      <go:slidesCustomData xmlns:go="http://customooxmlschemas.google.com/" xmlns:ahyp="http://schemas.microsoft.com/office/drawing/2018/hyperlinkcolor" xmlns:p15="http://schemas.microsoft.com/office/powerpoint/2012/main" xmlns:p14="http://schemas.microsoft.com/office/powerpoint/2010/main" xmlns:com="http://schemas.openxmlformats.org/drawingml/2006/compatibility" xmlns:pvml="urn:schemas-microsoft-com:office:powerpoint" xmlns:v="urn:schemas-microsoft-com:vml" xmlns:o="urn:schemas-microsoft-com:office:office" xmlns:dgm="http://schemas.openxmlformats.org/drawingml/2006/diagram" xmlns:c="http://schemas.openxmlformats.org/drawingml/2006/chart" xmlns:mv="urn:schemas-microsoft-com:mac:vml" xmlns:mc="http://schemas.openxmlformats.org/markup-compatibility/2006" xmlns="" r:id="rId17" roundtripDataSignature="AMtx7mh6cvCcE10IumkqE4PQr4/dElO6RA=="/>
+      <go:slidesCustomData xmlns="" xmlns:mc="http://schemas.openxmlformats.org/markup-compatibility/2006" xmlns:mv="urn:schemas-microsoft-com:mac:vml" xmlns:c="http://schemas.openxmlformats.org/drawingml/2006/chart" xmlns:dgm="http://schemas.openxmlformats.org/drawingml/2006/diagram" xmlns:o="urn:schemas-microsoft-com:office:office" xmlns:v="urn:schemas-microsoft-com:vml" xmlns:pvml="urn:schemas-microsoft-com:office:powerpoint" xmlns:com="http://schemas.openxmlformats.org/drawingml/2006/compatibility" xmlns:p14="http://schemas.microsoft.com/office/powerpoint/2010/main" xmlns:p15="http://schemas.microsoft.com/office/powerpoint/2012/main" xmlns:ahyp="http://schemas.microsoft.com/office/drawing/2018/hyperlinkcolor" xmlns:go="http://customooxmlschemas.google.com/" r:id="rId17" roundtripDataSignature="AMtx7mh6cvCcE10IumkqE4PQr4/dElO6RA=="/>
     </p:ext>
   </p:extLst>
 </p:presentation>
@@ -981,128 +980,6 @@
   <p:cSld>
     <p:spTree>
       <p:nvGrpSpPr>
-        <p:cNvPr id="1" name="Shape 105"/>
-        <p:cNvGrpSpPr/>
-        <p:nvPr/>
-      </p:nvGrpSpPr>
-      <p:grpSpPr>
-        <a:xfrm>
-          <a:off x="0" y="0"/>
-          <a:ext cx="0" cy="0"/>
-          <a:chOff x="0" y="0"/>
-          <a:chExt cx="0" cy="0"/>
-        </a:xfrm>
-      </p:grpSpPr>
-      <p:sp>
-        <p:nvSpPr>
-          <p:cNvPr id="106" name="Google Shape;106;p9:notes"/>
-          <p:cNvSpPr>
-            <a:spLocks noGrp="1" noRot="1" noChangeAspect="1"/>
-          </p:cNvSpPr>
-          <p:nvPr>
-            <p:ph type="sldImg" idx="2"/>
-          </p:nvPr>
-        </p:nvSpPr>
-        <p:spPr>
-          <a:xfrm>
-            <a:off x="381300" y="685800"/>
-            <a:ext cx="6096000" cy="3429000"/>
-          </a:xfrm>
-          <a:custGeom>
-            <a:avLst/>
-            <a:gdLst/>
-            <a:ahLst/>
-            <a:cxnLst/>
-            <a:rect l="l" t="t" r="r" b="b"/>
-            <a:pathLst>
-              <a:path w="120000" h="120000" extrusionOk="0">
-                <a:moveTo>
-                  <a:pt x="0" y="0"/>
-                </a:moveTo>
-                <a:lnTo>
-                  <a:pt x="120000" y="0"/>
-                </a:lnTo>
-                <a:lnTo>
-                  <a:pt x="120000" y="120000"/>
-                </a:lnTo>
-                <a:lnTo>
-                  <a:pt x="0" y="120000"/>
-                </a:lnTo>
-                <a:close/>
-              </a:path>
-            </a:pathLst>
-          </a:custGeom>
-          <a:noFill/>
-          <a:ln w="9525" cap="flat" cmpd="sng">
-            <a:solidFill>
-              <a:srgbClr val="000000"/>
-            </a:solidFill>
-            <a:prstDash val="solid"/>
-            <a:round/>
-            <a:headEnd type="none" w="sm" len="sm"/>
-            <a:tailEnd type="none" w="sm" len="sm"/>
-          </a:ln>
-        </p:spPr>
-      </p:sp>
-      <p:sp>
-        <p:nvSpPr>
-          <p:cNvPr id="107" name="Google Shape;107;p9:notes"/>
-          <p:cNvSpPr txBox="1">
-            <a:spLocks noGrp="1"/>
-          </p:cNvSpPr>
-          <p:nvPr>
-            <p:ph type="body" idx="1"/>
-          </p:nvPr>
-        </p:nvSpPr>
-        <p:spPr>
-          <a:xfrm>
-            <a:off x="685800" y="4343400"/>
-            <a:ext cx="5486400" cy="4114800"/>
-          </a:xfrm>
-          <a:prstGeom prst="rect">
-            <a:avLst/>
-          </a:prstGeom>
-          <a:noFill/>
-          <a:ln>
-            <a:noFill/>
-          </a:ln>
-        </p:spPr>
-        <p:txBody>
-          <a:bodyPr spcFirstLastPara="1" wrap="square" lIns="91425" tIns="91425" rIns="91425" bIns="91425" anchor="t" anchorCtr="0">
-            <a:noAutofit/>
-          </a:bodyPr>
-          <a:lstStyle/>
-          <a:p>
-            <a:pPr marL="0" lvl="0" indent="0" algn="l" rtl="0">
-              <a:lnSpc>
-                <a:spcPct val="100000"/>
-              </a:lnSpc>
-              <a:spcBef>
-                <a:spcPts val="0"/>
-              </a:spcBef>
-              <a:spcAft>
-                <a:spcPts val="0"/>
-              </a:spcAft>
-              <a:buSzPts val="1100"/>
-              <a:buNone/>
-            </a:pPr>
-            <a:endParaRPr/>
-          </a:p>
-        </p:txBody>
-      </p:sp>
-    </p:spTree>
-  </p:cSld>
-  <p:clrMapOvr>
-    <a:masterClrMapping/>
-  </p:clrMapOvr>
-</p:notes>
-</file>
-
-<file path=ppt/notesSlides/notesSlide11.xml><?xml version="1.0" encoding="utf-8"?>
-<p:notes xmlns:a="http://schemas.openxmlformats.org/drawingml/2006/main" xmlns:r="http://schemas.openxmlformats.org/officeDocument/2006/relationships" xmlns:p="http://schemas.openxmlformats.org/presentationml/2006/main" showMasterSp="0" showMasterPhAnim="0">
-  <p:cSld>
-    <p:spTree>
-      <p:nvGrpSpPr>
         <p:cNvPr id="1" name="Shape 112"/>
         <p:cNvGrpSpPr/>
         <p:nvPr/>
@@ -1220,7 +1097,7 @@
 </p:notes>
 </file>
 
-<file path=ppt/notesSlides/notesSlide12.xml><?xml version="1.0" encoding="utf-8"?>
+<file path=ppt/notesSlides/notesSlide11.xml><?xml version="1.0" encoding="utf-8"?>
 <p:notes xmlns:a="http://schemas.openxmlformats.org/drawingml/2006/main" xmlns:r="http://schemas.openxmlformats.org/officeDocument/2006/relationships" xmlns:p="http://schemas.openxmlformats.org/presentationml/2006/main" showMasterSp="0" showMasterPhAnim="0">
   <p:cSld>
     <p:spTree>
@@ -1972,128 +1849,6 @@
   <p:cSld>
     <p:spTree>
       <p:nvGrpSpPr>
-        <p:cNvPr id="1" name="Shape 76"/>
-        <p:cNvGrpSpPr/>
-        <p:nvPr/>
-      </p:nvGrpSpPr>
-      <p:grpSpPr>
-        <a:xfrm>
-          <a:off x="0" y="0"/>
-          <a:ext cx="0" cy="0"/>
-          <a:chOff x="0" y="0"/>
-          <a:chExt cx="0" cy="0"/>
-        </a:xfrm>
-      </p:grpSpPr>
-      <p:sp>
-        <p:nvSpPr>
-          <p:cNvPr id="77" name="Google Shape;77;p5:notes"/>
-          <p:cNvSpPr>
-            <a:spLocks noGrp="1" noRot="1" noChangeAspect="1"/>
-          </p:cNvSpPr>
-          <p:nvPr>
-            <p:ph type="sldImg" idx="2"/>
-          </p:nvPr>
-        </p:nvSpPr>
-        <p:spPr>
-          <a:xfrm>
-            <a:off x="381000" y="685800"/>
-            <a:ext cx="6096000" cy="3429000"/>
-          </a:xfrm>
-          <a:custGeom>
-            <a:avLst/>
-            <a:gdLst/>
-            <a:ahLst/>
-            <a:cxnLst/>
-            <a:rect l="l" t="t" r="r" b="b"/>
-            <a:pathLst>
-              <a:path w="120000" h="120000" extrusionOk="0">
-                <a:moveTo>
-                  <a:pt x="0" y="0"/>
-                </a:moveTo>
-                <a:lnTo>
-                  <a:pt x="120000" y="0"/>
-                </a:lnTo>
-                <a:lnTo>
-                  <a:pt x="120000" y="120000"/>
-                </a:lnTo>
-                <a:lnTo>
-                  <a:pt x="0" y="120000"/>
-                </a:lnTo>
-                <a:close/>
-              </a:path>
-            </a:pathLst>
-          </a:custGeom>
-          <a:noFill/>
-          <a:ln w="9525" cap="flat" cmpd="sng">
-            <a:solidFill>
-              <a:srgbClr val="000000"/>
-            </a:solidFill>
-            <a:prstDash val="solid"/>
-            <a:round/>
-            <a:headEnd type="none" w="sm" len="sm"/>
-            <a:tailEnd type="none" w="sm" len="sm"/>
-          </a:ln>
-        </p:spPr>
-      </p:sp>
-      <p:sp>
-        <p:nvSpPr>
-          <p:cNvPr id="78" name="Google Shape;78;p5:notes"/>
-          <p:cNvSpPr txBox="1">
-            <a:spLocks noGrp="1"/>
-          </p:cNvSpPr>
-          <p:nvPr>
-            <p:ph type="body" idx="1"/>
-          </p:nvPr>
-        </p:nvSpPr>
-        <p:spPr>
-          <a:xfrm>
-            <a:off x="685800" y="4343400"/>
-            <a:ext cx="5486400" cy="4114800"/>
-          </a:xfrm>
-          <a:prstGeom prst="rect">
-            <a:avLst/>
-          </a:prstGeom>
-          <a:noFill/>
-          <a:ln>
-            <a:noFill/>
-          </a:ln>
-        </p:spPr>
-        <p:txBody>
-          <a:bodyPr spcFirstLastPara="1" wrap="square" lIns="91425" tIns="91425" rIns="91425" bIns="91425" anchor="t" anchorCtr="0">
-            <a:noAutofit/>
-          </a:bodyPr>
-          <a:lstStyle/>
-          <a:p>
-            <a:pPr marL="0" lvl="0" indent="0" algn="l" rtl="0">
-              <a:lnSpc>
-                <a:spcPct val="100000"/>
-              </a:lnSpc>
-              <a:spcBef>
-                <a:spcPts val="0"/>
-              </a:spcBef>
-              <a:spcAft>
-                <a:spcPts val="0"/>
-              </a:spcAft>
-              <a:buSzPts val="1100"/>
-              <a:buNone/>
-            </a:pPr>
-            <a:endParaRPr/>
-          </a:p>
-        </p:txBody>
-      </p:sp>
-    </p:spTree>
-  </p:cSld>
-  <p:clrMapOvr>
-    <a:masterClrMapping/>
-  </p:clrMapOvr>
-</p:notes>
-</file>
-
-<file path=ppt/notesSlides/notesSlide8.xml><?xml version="1.0" encoding="utf-8"?>
-<p:notes xmlns:a="http://schemas.openxmlformats.org/drawingml/2006/main" xmlns:r="http://schemas.openxmlformats.org/officeDocument/2006/relationships" xmlns:p="http://schemas.openxmlformats.org/presentationml/2006/main" showMasterSp="0" showMasterPhAnim="0">
-  <p:cSld>
-    <p:spTree>
-      <p:nvGrpSpPr>
         <p:cNvPr id="1" name="Shape 91"/>
         <p:cNvGrpSpPr/>
         <p:nvPr/>
@@ -2211,7 +1966,7 @@
 </p:notes>
 </file>
 
-<file path=ppt/notesSlides/notesSlide9.xml><?xml version="1.0" encoding="utf-8"?>
+<file path=ppt/notesSlides/notesSlide8.xml><?xml version="1.0" encoding="utf-8"?>
 <p:notes xmlns:a="http://schemas.openxmlformats.org/drawingml/2006/main" xmlns:r="http://schemas.openxmlformats.org/officeDocument/2006/relationships" xmlns:p="http://schemas.openxmlformats.org/presentationml/2006/main" showMasterSp="0" showMasterPhAnim="0">
   <p:cSld>
     <p:spTree>
@@ -2282,6 +2037,128 @@
       <p:sp>
         <p:nvSpPr>
           <p:cNvPr id="100" name="Google Shape;100;p8:notes"/>
+          <p:cNvSpPr txBox="1">
+            <a:spLocks noGrp="1"/>
+          </p:cNvSpPr>
+          <p:nvPr>
+            <p:ph type="body" idx="1"/>
+          </p:nvPr>
+        </p:nvSpPr>
+        <p:spPr>
+          <a:xfrm>
+            <a:off x="685800" y="4343400"/>
+            <a:ext cx="5486400" cy="4114800"/>
+          </a:xfrm>
+          <a:prstGeom prst="rect">
+            <a:avLst/>
+          </a:prstGeom>
+          <a:noFill/>
+          <a:ln>
+            <a:noFill/>
+          </a:ln>
+        </p:spPr>
+        <p:txBody>
+          <a:bodyPr spcFirstLastPara="1" wrap="square" lIns="91425" tIns="91425" rIns="91425" bIns="91425" anchor="t" anchorCtr="0">
+            <a:noAutofit/>
+          </a:bodyPr>
+          <a:lstStyle/>
+          <a:p>
+            <a:pPr marL="0" lvl="0" indent="0" algn="l" rtl="0">
+              <a:lnSpc>
+                <a:spcPct val="100000"/>
+              </a:lnSpc>
+              <a:spcBef>
+                <a:spcPts val="0"/>
+              </a:spcBef>
+              <a:spcAft>
+                <a:spcPts val="0"/>
+              </a:spcAft>
+              <a:buSzPts val="1100"/>
+              <a:buNone/>
+            </a:pPr>
+            <a:endParaRPr/>
+          </a:p>
+        </p:txBody>
+      </p:sp>
+    </p:spTree>
+  </p:cSld>
+  <p:clrMapOvr>
+    <a:masterClrMapping/>
+  </p:clrMapOvr>
+</p:notes>
+</file>
+
+<file path=ppt/notesSlides/notesSlide9.xml><?xml version="1.0" encoding="utf-8"?>
+<p:notes xmlns:a="http://schemas.openxmlformats.org/drawingml/2006/main" xmlns:r="http://schemas.openxmlformats.org/officeDocument/2006/relationships" xmlns:p="http://schemas.openxmlformats.org/presentationml/2006/main" showMasterSp="0" showMasterPhAnim="0">
+  <p:cSld>
+    <p:spTree>
+      <p:nvGrpSpPr>
+        <p:cNvPr id="1" name="Shape 105"/>
+        <p:cNvGrpSpPr/>
+        <p:nvPr/>
+      </p:nvGrpSpPr>
+      <p:grpSpPr>
+        <a:xfrm>
+          <a:off x="0" y="0"/>
+          <a:ext cx="0" cy="0"/>
+          <a:chOff x="0" y="0"/>
+          <a:chExt cx="0" cy="0"/>
+        </a:xfrm>
+      </p:grpSpPr>
+      <p:sp>
+        <p:nvSpPr>
+          <p:cNvPr id="106" name="Google Shape;106;p9:notes"/>
+          <p:cNvSpPr>
+            <a:spLocks noGrp="1" noRot="1" noChangeAspect="1"/>
+          </p:cNvSpPr>
+          <p:nvPr>
+            <p:ph type="sldImg" idx="2"/>
+          </p:nvPr>
+        </p:nvSpPr>
+        <p:spPr>
+          <a:xfrm>
+            <a:off x="381300" y="685800"/>
+            <a:ext cx="6096000" cy="3429000"/>
+          </a:xfrm>
+          <a:custGeom>
+            <a:avLst/>
+            <a:gdLst/>
+            <a:ahLst/>
+            <a:cxnLst/>
+            <a:rect l="l" t="t" r="r" b="b"/>
+            <a:pathLst>
+              <a:path w="120000" h="120000" extrusionOk="0">
+                <a:moveTo>
+                  <a:pt x="0" y="0"/>
+                </a:moveTo>
+                <a:lnTo>
+                  <a:pt x="120000" y="0"/>
+                </a:lnTo>
+                <a:lnTo>
+                  <a:pt x="120000" y="120000"/>
+                </a:lnTo>
+                <a:lnTo>
+                  <a:pt x="0" y="120000"/>
+                </a:lnTo>
+                <a:close/>
+              </a:path>
+            </a:pathLst>
+          </a:custGeom>
+          <a:noFill/>
+          <a:ln w="9525" cap="flat" cmpd="sng">
+            <a:solidFill>
+              <a:srgbClr val="000000"/>
+            </a:solidFill>
+            <a:prstDash val="solid"/>
+            <a:round/>
+            <a:headEnd type="none" w="sm" len="sm"/>
+            <a:tailEnd type="none" w="sm" len="sm"/>
+          </a:ln>
+        </p:spPr>
+      </p:sp>
+      <p:sp>
+        <p:nvSpPr>
+          <p:cNvPr id="107" name="Google Shape;107;p9:notes"/>
           <p:cNvSpPr txBox="1">
             <a:spLocks noGrp="1"/>
           </p:cNvSpPr>
@@ -10271,426 +10148,6 @@
   <p:cSld>
     <p:spTree>
       <p:nvGrpSpPr>
-        <p:cNvPr id="1" name="Shape 101"/>
-        <p:cNvGrpSpPr/>
-        <p:nvPr/>
-      </p:nvGrpSpPr>
-      <p:grpSpPr>
-        <a:xfrm>
-          <a:off x="0" y="0"/>
-          <a:ext cx="0" cy="0"/>
-          <a:chOff x="0" y="0"/>
-          <a:chExt cx="0" cy="0"/>
-        </a:xfrm>
-      </p:grpSpPr>
-      <p:pic>
-        <p:nvPicPr>
-          <p:cNvPr id="3" name="Picture 2">
-            <a:extLst>
-              <a:ext uri="{FF2B5EF4-FFF2-40B4-BE49-F238E27FC236}">
-                <a16:creationId xmlns:a16="http://schemas.microsoft.com/office/drawing/2014/main" id="{DC14A976-3EA1-ACB4-AF03-82A9A1F5770E}"/>
-              </a:ext>
-            </a:extLst>
-          </p:cNvPr>
-          <p:cNvPicPr>
-            <a:picLocks noChangeAspect="1"/>
-          </p:cNvPicPr>
-          <p:nvPr/>
-        </p:nvPicPr>
-        <p:blipFill>
-          <a:blip r:embed="rId3"/>
-          <a:stretch>
-            <a:fillRect/>
-          </a:stretch>
-        </p:blipFill>
-        <p:spPr>
-          <a:xfrm>
-            <a:off x="694365" y="2339270"/>
-            <a:ext cx="7755270" cy="2738402"/>
-          </a:xfrm>
-          <a:prstGeom prst="rect">
-            <a:avLst/>
-          </a:prstGeom>
-        </p:spPr>
-      </p:pic>
-      <p:sp>
-        <p:nvSpPr>
-          <p:cNvPr id="102" name="Google Shape;102;p8"/>
-          <p:cNvSpPr txBox="1">
-            <a:spLocks noGrp="1"/>
-          </p:cNvSpPr>
-          <p:nvPr>
-            <p:ph type="title"/>
-          </p:nvPr>
-        </p:nvSpPr>
-        <p:spPr>
-          <a:xfrm>
-            <a:off x="139325" y="0"/>
-            <a:ext cx="8520600" cy="572700"/>
-          </a:xfrm>
-          <a:prstGeom prst="rect">
-            <a:avLst/>
-          </a:prstGeom>
-          <a:noFill/>
-          <a:ln>
-            <a:noFill/>
-          </a:ln>
-        </p:spPr>
-        <p:txBody>
-          <a:bodyPr spcFirstLastPara="1" wrap="square" lIns="91425" tIns="91425" rIns="91425" bIns="91425" anchor="t" anchorCtr="0">
-            <a:normAutofit fontScale="90000"/>
-          </a:bodyPr>
-          <a:lstStyle/>
-          <a:p>
-            <a:pPr marL="0" lvl="0" indent="0" algn="l" rtl="0">
-              <a:lnSpc>
-                <a:spcPct val="100000"/>
-              </a:lnSpc>
-              <a:spcBef>
-                <a:spcPts val="0"/>
-              </a:spcBef>
-              <a:spcAft>
-                <a:spcPts val="0"/>
-              </a:spcAft>
-              <a:buSzPct val="111111"/>
-              <a:buNone/>
-            </a:pPr>
-            <a:r>
-              <a:rPr lang="en" dirty="0"/>
-              <a:t>Authority Response</a:t>
-            </a:r>
-            <a:endParaRPr dirty="0"/>
-          </a:p>
-        </p:txBody>
-      </p:sp>
-      <p:sp>
-        <p:nvSpPr>
-          <p:cNvPr id="104" name="Google Shape;104;p8"/>
-          <p:cNvSpPr txBox="1"/>
-          <p:nvPr/>
-        </p:nvSpPr>
-        <p:spPr>
-          <a:xfrm>
-            <a:off x="139325" y="465635"/>
-            <a:ext cx="8774185" cy="1962045"/>
-          </a:xfrm>
-          <a:prstGeom prst="rect">
-            <a:avLst/>
-          </a:prstGeom>
-          <a:noFill/>
-          <a:ln>
-            <a:noFill/>
-          </a:ln>
-        </p:spPr>
-        <p:txBody>
-          <a:bodyPr spcFirstLastPara="1" wrap="square" lIns="91425" tIns="91425" rIns="91425" bIns="91425" anchor="t" anchorCtr="0">
-            <a:spAutoFit/>
-          </a:bodyPr>
-          <a:lstStyle/>
-          <a:p>
-            <a:pPr marL="0" lvl="0" indent="0" algn="l" rtl="0">
-              <a:spcBef>
-                <a:spcPts val="0"/>
-              </a:spcBef>
-              <a:spcAft>
-                <a:spcPts val="0"/>
-              </a:spcAft>
-              <a:buClr>
-                <a:schemeClr val="dk1"/>
-              </a:buClr>
-              <a:buSzPts val="1100"/>
-              <a:buFont typeface="Arial"/>
-              <a:buNone/>
-            </a:pPr>
-            <a:r>
-              <a:rPr lang="en" sz="1050" b="1" dirty="0">
-                <a:solidFill>
-                  <a:schemeClr val="dk1"/>
-                </a:solidFill>
-              </a:rPr>
-              <a:t>Assignment</a:t>
-            </a:r>
-            <a:r>
-              <a:rPr lang="en" sz="1050" dirty="0">
-                <a:solidFill>
-                  <a:schemeClr val="dk1"/>
-                </a:solidFill>
-              </a:rPr>
-              <a:t>: Officials are assigned to monitor, prevent, contain, and mitigate the disease outbreak</a:t>
-            </a:r>
-          </a:p>
-          <a:p>
-            <a:pPr marL="0" lvl="0" indent="0" algn="l" rtl="0">
-              <a:spcBef>
-                <a:spcPts val="0"/>
-              </a:spcBef>
-              <a:spcAft>
-                <a:spcPts val="0"/>
-              </a:spcAft>
-              <a:buClr>
-                <a:schemeClr val="dk1"/>
-              </a:buClr>
-              <a:buSzPts val="1100"/>
-              <a:buFont typeface="Arial"/>
-              <a:buNone/>
-            </a:pPr>
-            <a:r>
-              <a:rPr lang="en" sz="1050" b="1" dirty="0">
-                <a:solidFill>
-                  <a:schemeClr val="dk1"/>
-                </a:solidFill>
-              </a:rPr>
-              <a:t>Inspection: </a:t>
-            </a:r>
-            <a:r>
-              <a:rPr lang="en" sz="1050" dirty="0">
-                <a:solidFill>
-                  <a:schemeClr val="dk1"/>
-                </a:solidFill>
-              </a:rPr>
-              <a:t>Officials inspect the source of the disease to devise countermeasures</a:t>
-            </a:r>
-          </a:p>
-          <a:p>
-            <a:pPr>
-              <a:buClr>
-                <a:schemeClr val="dk1"/>
-              </a:buClr>
-              <a:buSzPts val="1100"/>
-            </a:pPr>
-            <a:r>
-              <a:rPr lang="en" sz="1050" b="1" dirty="0">
-                <a:solidFill>
-                  <a:schemeClr val="dk1"/>
-                </a:solidFill>
-              </a:rPr>
-              <a:t>Destruction</a:t>
-            </a:r>
-            <a:r>
-              <a:rPr lang="en" sz="1050" dirty="0">
-                <a:solidFill>
-                  <a:schemeClr val="dk1"/>
-                </a:solidFill>
-              </a:rPr>
-              <a:t>: </a:t>
-            </a:r>
-            <a:r>
-              <a:rPr lang="en-US" sz="1050" dirty="0">
-                <a:solidFill>
-                  <a:schemeClr val="dk1"/>
-                </a:solidFill>
-              </a:rPr>
-              <a:t>Government destroys the source of the disease, for example, Haiti demolished the fishing nuts where the Cholera epidemic started.</a:t>
-            </a:r>
-          </a:p>
-          <a:p>
-            <a:pPr>
-              <a:buClr>
-                <a:schemeClr val="dk1"/>
-              </a:buClr>
-              <a:buSzPts val="1100"/>
-            </a:pPr>
-            <a:r>
-              <a:rPr lang="en" sz="1050" b="1" dirty="0">
-                <a:solidFill>
-                  <a:schemeClr val="dk1"/>
-                </a:solidFill>
-              </a:rPr>
-              <a:t>Gov Health Decree</a:t>
-            </a:r>
-            <a:r>
-              <a:rPr lang="en" sz="1050" dirty="0">
-                <a:solidFill>
-                  <a:schemeClr val="dk1"/>
-                </a:solidFill>
-              </a:rPr>
-              <a:t>: Legislations were issued fighting the disease outbreak by government</a:t>
-            </a:r>
-          </a:p>
-          <a:p>
-            <a:pPr>
-              <a:buClr>
-                <a:schemeClr val="dk1"/>
-              </a:buClr>
-              <a:buSzPts val="1100"/>
-            </a:pPr>
-            <a:r>
-              <a:rPr lang="en" sz="1050" b="1" dirty="0">
-                <a:solidFill>
-                  <a:schemeClr val="dk1"/>
-                </a:solidFill>
-              </a:rPr>
-              <a:t>Information Campaign</a:t>
-            </a:r>
-            <a:r>
-              <a:rPr lang="en" sz="1050" dirty="0">
-                <a:solidFill>
-                  <a:schemeClr val="dk1"/>
-                </a:solidFill>
-              </a:rPr>
-              <a:t>: Use of media to inform public about the disease</a:t>
-            </a:r>
-          </a:p>
-          <a:p>
-            <a:pPr>
-              <a:buClr>
-                <a:schemeClr val="dk1"/>
-              </a:buClr>
-              <a:buSzPts val="1100"/>
-            </a:pPr>
-            <a:r>
-              <a:rPr lang="en" sz="1050" b="1" dirty="0">
-                <a:solidFill>
-                  <a:schemeClr val="dk1"/>
-                </a:solidFill>
-              </a:rPr>
-              <a:t>Debunk Misinformation</a:t>
-            </a:r>
-            <a:r>
-              <a:rPr lang="en" sz="1050" dirty="0">
-                <a:solidFill>
-                  <a:schemeClr val="dk1"/>
-                </a:solidFill>
-              </a:rPr>
-              <a:t>: Debunking misinformation of related to the disease outbreak</a:t>
-            </a:r>
-          </a:p>
-          <a:p>
-            <a:pPr>
-              <a:buClr>
-                <a:schemeClr val="dk1"/>
-              </a:buClr>
-              <a:buSzPts val="1100"/>
-            </a:pPr>
-            <a:r>
-              <a:rPr lang="en" sz="1050" b="1" dirty="0">
-                <a:solidFill>
-                  <a:schemeClr val="dk1"/>
-                </a:solidFill>
-              </a:rPr>
-              <a:t>Close Border</a:t>
-            </a:r>
-            <a:r>
-              <a:rPr lang="en" sz="1050" dirty="0">
-                <a:solidFill>
-                  <a:schemeClr val="dk1"/>
-                </a:solidFill>
-              </a:rPr>
-              <a:t>: Border were closed to slow the spread of the virus</a:t>
-            </a:r>
-          </a:p>
-          <a:p>
-            <a:pPr>
-              <a:buClr>
-                <a:schemeClr val="dk1"/>
-              </a:buClr>
-              <a:buSzPts val="1100"/>
-            </a:pPr>
-            <a:r>
-              <a:rPr lang="en" sz="1050" b="1" dirty="0">
-                <a:solidFill>
-                  <a:schemeClr val="dk1"/>
-                </a:solidFill>
-              </a:rPr>
-              <a:t>Distribute</a:t>
-            </a:r>
-            <a:r>
-              <a:rPr lang="en" sz="1050" dirty="0">
-                <a:solidFill>
-                  <a:schemeClr val="dk1"/>
-                </a:solidFill>
-              </a:rPr>
-              <a:t>: Distributing the vaccines of the virus</a:t>
-            </a:r>
-          </a:p>
-          <a:p>
-            <a:pPr>
-              <a:buClr>
-                <a:schemeClr val="dk1"/>
-              </a:buClr>
-              <a:buSzPts val="1100"/>
-            </a:pPr>
-            <a:r>
-              <a:rPr lang="en" sz="1050" b="1" dirty="0">
-                <a:solidFill>
-                  <a:schemeClr val="dk1"/>
-                </a:solidFill>
-              </a:rPr>
-              <a:t>Financial Aid</a:t>
-            </a:r>
-            <a:r>
-              <a:rPr lang="en" sz="1050" dirty="0">
-                <a:solidFill>
-                  <a:schemeClr val="dk1"/>
-                </a:solidFill>
-              </a:rPr>
-              <a:t>: Financial assistance with food, housing and bills</a:t>
-            </a:r>
-          </a:p>
-          <a:p>
-            <a:pPr>
-              <a:buClr>
-                <a:schemeClr val="dk1"/>
-              </a:buClr>
-              <a:buSzPts val="1100"/>
-            </a:pPr>
-            <a:r>
-              <a:rPr lang="en" sz="1050" b="1" dirty="0" err="1">
-                <a:solidFill>
-                  <a:schemeClr val="dk1"/>
-                </a:solidFill>
-              </a:rPr>
-              <a:t>ExchangeBuySell</a:t>
-            </a:r>
-            <a:r>
-              <a:rPr lang="en" sz="1050" dirty="0">
-                <a:solidFill>
-                  <a:schemeClr val="dk1"/>
-                </a:solidFill>
-              </a:rPr>
-              <a:t>: Buying, selling or exchanging goods related to the disease outbreak</a:t>
-            </a:r>
-          </a:p>
-          <a:p>
-            <a:pPr>
-              <a:buClr>
-                <a:schemeClr val="dk1"/>
-              </a:buClr>
-              <a:buSzPts val="1100"/>
-            </a:pPr>
-            <a:r>
-              <a:rPr lang="en" sz="1050" b="1" dirty="0">
-                <a:solidFill>
-                  <a:schemeClr val="dk1"/>
-                </a:solidFill>
-              </a:rPr>
-              <a:t>Donate</a:t>
-            </a:r>
-            <a:r>
-              <a:rPr lang="en" sz="1050" dirty="0">
-                <a:solidFill>
-                  <a:schemeClr val="dk1"/>
-                </a:solidFill>
-              </a:rPr>
-              <a:t>: Charitable activities related to the disease outbreak</a:t>
-            </a:r>
-            <a:endParaRPr dirty="0"/>
-          </a:p>
-        </p:txBody>
-      </p:sp>
-    </p:spTree>
-  </p:cSld>
-  <p:clrMapOvr>
-    <a:masterClrMapping/>
-  </p:clrMapOvr>
-</p:sld>
-</file>
-
-<file path=ppt/slides/slide11.xml><?xml version="1.0" encoding="utf-8"?>
-<p:sld xmlns:a="http://schemas.openxmlformats.org/drawingml/2006/main" xmlns:r="http://schemas.openxmlformats.org/officeDocument/2006/relationships" xmlns:p="http://schemas.openxmlformats.org/presentationml/2006/main">
-  <p:cSld>
-    <p:spTree>
-      <p:nvGrpSpPr>
         <p:cNvPr id="1" name="Shape 108"/>
         <p:cNvGrpSpPr/>
         <p:nvPr/>
@@ -11369,7 +10826,7 @@
 </p:sld>
 </file>
 
-<file path=ppt/slides/slide12.xml><?xml version="1.0" encoding="utf-8"?>
+<file path=ppt/slides/slide11.xml><?xml version="1.0" encoding="utf-8"?>
 <p:sld xmlns:a="http://schemas.openxmlformats.org/drawingml/2006/main" xmlns:r="http://schemas.openxmlformats.org/officeDocument/2006/relationships" xmlns:p="http://schemas.openxmlformats.org/presentationml/2006/main">
   <p:cSld>
     <p:spTree>
@@ -11765,7 +11222,7 @@
 </p:sld>
 </file>
 
-<file path=ppt/slides/slide13.xml><?xml version="1.0" encoding="utf-8"?>
+<file path=ppt/slides/slide12.xml><?xml version="1.0" encoding="utf-8"?>
 <p:sld xmlns:a="http://schemas.openxmlformats.org/drawingml/2006/main" xmlns:r="http://schemas.openxmlformats.org/officeDocument/2006/relationships" xmlns:p="http://schemas.openxmlformats.org/presentationml/2006/main">
   <p:cSld>
     <p:spTree>
@@ -12293,30 +11750,32 @@
       </p:sp>
       <p:pic>
         <p:nvPicPr>
-          <p:cNvPr id="61" name="Google Shape;61;p2"/>
-          <p:cNvPicPr preferRelativeResize="0"/>
+          <p:cNvPr id="2" name="Picture 1">
+            <a:extLst>
+              <a:ext uri="{FF2B5EF4-FFF2-40B4-BE49-F238E27FC236}">
+                <a16:creationId xmlns:a16="http://schemas.microsoft.com/office/drawing/2014/main" id="{26AF9A11-EC8C-4DAD-3962-6412E24FC4C6}"/>
+              </a:ext>
+            </a:extLst>
+          </p:cNvPr>
+          <p:cNvPicPr>
+            <a:picLocks noChangeAspect="1"/>
+          </p:cNvPicPr>
           <p:nvPr/>
         </p:nvPicPr>
         <p:blipFill>
-          <a:blip r:embed="rId3">
-            <a:alphaModFix/>
-          </a:blip>
+          <a:blip r:embed="rId3"/>
           <a:stretch>
             <a:fillRect/>
           </a:stretch>
         </p:blipFill>
         <p:spPr>
           <a:xfrm>
-            <a:off x="482175" y="1017725"/>
-            <a:ext cx="8179656" cy="3820975"/>
+            <a:off x="311700" y="1059668"/>
+            <a:ext cx="8070574" cy="3638807"/>
           </a:xfrm>
           <a:prstGeom prst="rect">
             <a:avLst/>
           </a:prstGeom>
-          <a:noFill/>
-          <a:ln>
-            <a:noFill/>
-          </a:ln>
         </p:spPr>
       </p:pic>
     </p:spTree>
@@ -12932,36 +12391,6 @@
           <a:chExt cx="0" cy="0"/>
         </a:xfrm>
       </p:grpSpPr>
-      <p:pic>
-        <p:nvPicPr>
-          <p:cNvPr id="5" name="Picture 4">
-            <a:extLst>
-              <a:ext uri="{FF2B5EF4-FFF2-40B4-BE49-F238E27FC236}">
-                <a16:creationId xmlns:a16="http://schemas.microsoft.com/office/drawing/2014/main" id="{D178A332-6A09-60E1-8FD8-8BD65905FDAB}"/>
-              </a:ext>
-            </a:extLst>
-          </p:cNvPr>
-          <p:cNvPicPr>
-            <a:picLocks noChangeAspect="1"/>
-          </p:cNvPicPr>
-          <p:nvPr/>
-        </p:nvPicPr>
-        <p:blipFill>
-          <a:blip r:embed="rId3"/>
-          <a:stretch>
-            <a:fillRect/>
-          </a:stretch>
-        </p:blipFill>
-        <p:spPr>
-          <a:xfrm>
-            <a:off x="1041129" y="2754827"/>
-            <a:ext cx="7015942" cy="2358913"/>
-          </a:xfrm>
-          <a:prstGeom prst="rect">
-            <a:avLst/>
-          </a:prstGeom>
-        </p:spPr>
-      </p:pic>
       <p:sp>
         <p:nvSpPr>
           <p:cNvPr id="73" name="Google Shape;73;p4"/>
@@ -13006,7 +12435,7 @@
             </a:pPr>
             <a:r>
               <a:rPr lang="en" dirty="0"/>
-              <a:t>Onset</a:t>
+              <a:t>Outbreak</a:t>
             </a:r>
             <a:endParaRPr dirty="0"/>
           </a:p>
@@ -13021,7 +12450,7 @@
         <p:spPr>
           <a:xfrm>
             <a:off x="175574" y="346606"/>
-            <a:ext cx="8294400" cy="2616070"/>
+            <a:ext cx="8294400" cy="2728409"/>
           </a:xfrm>
           <a:prstGeom prst="rect">
             <a:avLst/>
@@ -13052,7 +12481,7 @@
                   <a:schemeClr val="dk1"/>
                 </a:solidFill>
               </a:rPr>
-              <a:t>Contaminate Substance: </a:t>
+              <a:t>Mutation: </a:t>
             </a:r>
             <a:r>
               <a:rPr lang="en-US" sz="1000" dirty="0">
@@ -13060,34 +12489,7 @@
                   <a:schemeClr val="dk1"/>
                 </a:solidFill>
               </a:rPr>
-              <a:t>Presence of an unwanted constituent, harmful substance or impurity in a material, physical body, or environment. Contaminated object could be food, liquid or air.</a:t>
-            </a:r>
-          </a:p>
-          <a:p>
-            <a:pPr>
-              <a:lnSpc>
-                <a:spcPct val="115000"/>
-              </a:lnSpc>
-              <a:buClr>
-                <a:schemeClr val="dk1"/>
-              </a:buClr>
-              <a:buSzPts val="1100"/>
-            </a:pPr>
-            <a:r>
-              <a:rPr lang="en-US" sz="1000" b="1" dirty="0">
-                <a:solidFill>
-                  <a:schemeClr val="dk1"/>
-                </a:solidFill>
-              </a:rPr>
-              <a:t>Purchase Contaminated Object: </a:t>
-            </a:r>
-            <a:r>
-              <a:rPr lang="en-US" sz="1000" dirty="0">
-                <a:solidFill>
-                  <a:schemeClr val="dk1"/>
-                </a:solidFill>
-              </a:rPr>
-              <a:t>Optionally, the victim purchases the contaminated food or liquid. </a:t>
+              <a:t>The virus may undergo an alteration in the nucleotide sequence of the genome during the disease outbreak</a:t>
             </a:r>
             <a:endParaRPr lang="en" sz="1000" dirty="0">
               <a:solidFill>
@@ -13111,7 +12513,7 @@
                   <a:schemeClr val="dk1"/>
                 </a:solidFill>
               </a:rPr>
-              <a:t>Consume: </a:t>
+              <a:t>Contaminate Substance: </a:t>
             </a:r>
             <a:r>
               <a:rPr lang="en-US" sz="1000" dirty="0">
@@ -13119,7 +12521,7 @@
                   <a:schemeClr val="dk1"/>
                 </a:solidFill>
               </a:rPr>
-              <a:t>Consumption of a substance by an organism.</a:t>
+              <a:t>Presence of an unwanted constituent, harmful substance or impurity in a material, physical body, or environment. Contaminated object could be food, liquid or air.</a:t>
             </a:r>
           </a:p>
           <a:p>
@@ -13138,6 +12540,65 @@
                   <a:schemeClr val="dk1"/>
                 </a:solidFill>
               </a:rPr>
+              <a:t>Purchase Contaminated Object: </a:t>
+            </a:r>
+            <a:r>
+              <a:rPr lang="en-US" sz="1000" dirty="0">
+                <a:solidFill>
+                  <a:schemeClr val="dk1"/>
+                </a:solidFill>
+              </a:rPr>
+              <a:t>Optionally, the victim purchases the contaminated food or liquid. </a:t>
+            </a:r>
+            <a:endParaRPr lang="en" sz="1000" dirty="0">
+              <a:solidFill>
+                <a:schemeClr val="dk1"/>
+              </a:solidFill>
+            </a:endParaRPr>
+          </a:p>
+          <a:p>
+            <a:pPr>
+              <a:lnSpc>
+                <a:spcPct val="115000"/>
+              </a:lnSpc>
+              <a:buClr>
+                <a:schemeClr val="dk1"/>
+              </a:buClr>
+              <a:buSzPts val="1100"/>
+            </a:pPr>
+            <a:r>
+              <a:rPr lang="en" sz="1000" b="1" dirty="0">
+                <a:solidFill>
+                  <a:schemeClr val="dk1"/>
+                </a:solidFill>
+              </a:rPr>
+              <a:t>Consume: </a:t>
+            </a:r>
+            <a:r>
+              <a:rPr lang="en-US" sz="1000" dirty="0">
+                <a:solidFill>
+                  <a:schemeClr val="dk1"/>
+                </a:solidFill>
+              </a:rPr>
+              <a:t>Consumption of a substance by an organism.</a:t>
+            </a:r>
+          </a:p>
+          <a:p>
+            <a:pPr>
+              <a:lnSpc>
+                <a:spcPct val="115000"/>
+              </a:lnSpc>
+              <a:buClr>
+                <a:schemeClr val="dk1"/>
+              </a:buClr>
+              <a:buSzPts val="1100"/>
+            </a:pPr>
+            <a:r>
+              <a:rPr lang="en-US" sz="1000" b="1" dirty="0">
+                <a:solidFill>
+                  <a:schemeClr val="dk1"/>
+                </a:solidFill>
+              </a:rPr>
               <a:t>Transmission:</a:t>
             </a:r>
             <a:r>
@@ -13146,7 +12607,7 @@
                   <a:schemeClr val="dk1"/>
                 </a:solidFill>
               </a:rPr>
-              <a:t> passing of a pathogen causing communicable disease from an infected host individual or group to other individual or group, regardless of whether the other individual was previously infected </a:t>
+              <a:t> passing of a pathogen causing communicable disease from an infected host individual or group to other individual or group</a:t>
             </a:r>
           </a:p>
           <a:p>
@@ -13205,7 +12666,7 @@
                   <a:schemeClr val="dk1"/>
                 </a:solidFill>
               </a:rPr>
-              <a:t>Early Illness</a:t>
+              <a:t>Illness</a:t>
             </a:r>
             <a:r>
               <a:rPr lang="en" sz="1000" dirty="0">
@@ -13317,10 +12778,74 @@
               </a:rPr>
               <a:t>: Alerting and reporting the detected outbreak to state and local public health authorities</a:t>
             </a:r>
-            <a:endParaRPr sz="1200" dirty="0"/>
+          </a:p>
+          <a:p>
+            <a:pPr marL="0" lvl="0" indent="0" algn="l" rtl="0">
+              <a:lnSpc>
+                <a:spcPct val="115000"/>
+              </a:lnSpc>
+              <a:spcBef>
+                <a:spcPts val="600"/>
+              </a:spcBef>
+              <a:spcAft>
+                <a:spcPts val="0"/>
+              </a:spcAft>
+              <a:buClr>
+                <a:schemeClr val="dk1"/>
+              </a:buClr>
+              <a:buSzPts val="1100"/>
+              <a:buFont typeface="Arial"/>
+              <a:buNone/>
+            </a:pPr>
+            <a:r>
+              <a:rPr lang="en-US" sz="1000" b="1" dirty="0">
+                <a:solidFill>
+                  <a:schemeClr val="dk1"/>
+                </a:solidFill>
+              </a:rPr>
+              <a:t>Construction</a:t>
+            </a:r>
+            <a:r>
+              <a:rPr lang="en-US" sz="1000" dirty="0">
+                <a:solidFill>
+                  <a:schemeClr val="dk1"/>
+                </a:solidFill>
+              </a:rPr>
+              <a:t>: Field hospitals may be constructed to accommodate patients during the outbreak</a:t>
+            </a:r>
           </a:p>
         </p:txBody>
       </p:sp>
+      <p:pic>
+        <p:nvPicPr>
+          <p:cNvPr id="3" name="Picture 2">
+            <a:extLst>
+              <a:ext uri="{FF2B5EF4-FFF2-40B4-BE49-F238E27FC236}">
+                <a16:creationId xmlns:a16="http://schemas.microsoft.com/office/drawing/2014/main" id="{682D208F-BD64-3083-3DCE-168DDB59A530}"/>
+              </a:ext>
+            </a:extLst>
+          </p:cNvPr>
+          <p:cNvPicPr>
+            <a:picLocks noChangeAspect="1"/>
+          </p:cNvPicPr>
+          <p:nvPr/>
+        </p:nvPicPr>
+        <p:blipFill>
+          <a:blip r:embed="rId3"/>
+          <a:stretch>
+            <a:fillRect/>
+          </a:stretch>
+        </p:blipFill>
+        <p:spPr>
+          <a:xfrm>
+            <a:off x="990581" y="3139648"/>
+            <a:ext cx="6664385" cy="1764932"/>
+          </a:xfrm>
+          <a:prstGeom prst="rect">
+            <a:avLst/>
+          </a:prstGeom>
+        </p:spPr>
+      </p:pic>
     </p:spTree>
     <p:extLst>
       <p:ext uri="{BB962C8B-B14F-4D97-AF65-F5344CB8AC3E}">
@@ -13335,6 +12860,451 @@
 </file>
 
 <file path=ppt/slides/slide6.xml><?xml version="1.0" encoding="utf-8"?>
+<p:sld xmlns:a="http://schemas.openxmlformats.org/drawingml/2006/main" xmlns:r="http://schemas.openxmlformats.org/officeDocument/2006/relationships" xmlns:p="http://schemas.openxmlformats.org/presentationml/2006/main">
+  <p:cSld>
+    <p:spTree>
+      <p:nvGrpSpPr>
+        <p:cNvPr id="1" name=""/>
+        <p:cNvGrpSpPr/>
+        <p:nvPr/>
+      </p:nvGrpSpPr>
+      <p:grpSpPr>
+        <a:xfrm>
+          <a:off x="0" y="0"/>
+          <a:ext cx="0" cy="0"/>
+          <a:chOff x="0" y="0"/>
+          <a:chExt cx="0" cy="0"/>
+        </a:xfrm>
+      </p:grpSpPr>
+      <p:pic>
+        <p:nvPicPr>
+          <p:cNvPr id="4" name="Picture 3">
+            <a:extLst>
+              <a:ext uri="{FF2B5EF4-FFF2-40B4-BE49-F238E27FC236}">
+                <a16:creationId xmlns:a16="http://schemas.microsoft.com/office/drawing/2014/main" id="{E3CF888B-217B-6E9F-8EEB-C2E8F53B18F4}"/>
+              </a:ext>
+            </a:extLst>
+          </p:cNvPr>
+          <p:cNvPicPr>
+            <a:picLocks noChangeAspect="1"/>
+          </p:cNvPicPr>
+          <p:nvPr/>
+        </p:nvPicPr>
+        <p:blipFill>
+          <a:blip r:embed="rId2"/>
+          <a:stretch>
+            <a:fillRect/>
+          </a:stretch>
+        </p:blipFill>
+        <p:spPr>
+          <a:xfrm>
+            <a:off x="2913233" y="0"/>
+            <a:ext cx="6116391" cy="5143500"/>
+          </a:xfrm>
+          <a:prstGeom prst="rect">
+            <a:avLst/>
+          </a:prstGeom>
+        </p:spPr>
+      </p:pic>
+      <p:sp>
+        <p:nvSpPr>
+          <p:cNvPr id="2" name="Title 1">
+            <a:extLst>
+              <a:ext uri="{FF2B5EF4-FFF2-40B4-BE49-F238E27FC236}">
+                <a16:creationId xmlns:a16="http://schemas.microsoft.com/office/drawing/2014/main" id="{31271C2A-38F7-A648-16BD-D9E45F5FAAAB}"/>
+              </a:ext>
+            </a:extLst>
+          </p:cNvPr>
+          <p:cNvSpPr>
+            <a:spLocks noGrp="1"/>
+          </p:cNvSpPr>
+          <p:nvPr>
+            <p:ph type="title"/>
+          </p:nvPr>
+        </p:nvSpPr>
+        <p:spPr>
+          <a:xfrm>
+            <a:off x="114376" y="63362"/>
+            <a:ext cx="2798857" cy="572700"/>
+          </a:xfrm>
+        </p:spPr>
+        <p:txBody>
+          <a:bodyPr>
+            <a:normAutofit fontScale="90000"/>
+          </a:bodyPr>
+          <a:lstStyle/>
+          <a:p>
+            <a:r>
+              <a:rPr lang="en-US" dirty="0"/>
+              <a:t>Medical Response</a:t>
+            </a:r>
+          </a:p>
+        </p:txBody>
+      </p:sp>
+      <p:sp>
+        <p:nvSpPr>
+          <p:cNvPr id="6" name="TextBox 5">
+            <a:extLst>
+              <a:ext uri="{FF2B5EF4-FFF2-40B4-BE49-F238E27FC236}">
+                <a16:creationId xmlns:a16="http://schemas.microsoft.com/office/drawing/2014/main" id="{20A07CB2-6F58-A739-DE8C-6C4FAC1E3765}"/>
+              </a:ext>
+            </a:extLst>
+          </p:cNvPr>
+          <p:cNvSpPr txBox="1"/>
+          <p:nvPr/>
+        </p:nvSpPr>
+        <p:spPr>
+          <a:xfrm>
+            <a:off x="0" y="636062"/>
+            <a:ext cx="2913233" cy="3624390"/>
+          </a:xfrm>
+          <a:prstGeom prst="rect">
+            <a:avLst/>
+          </a:prstGeom>
+          <a:noFill/>
+        </p:spPr>
+        <p:txBody>
+          <a:bodyPr wrap="square">
+            <a:spAutoFit/>
+          </a:bodyPr>
+          <a:lstStyle/>
+          <a:p>
+            <a:pPr marL="0" lvl="0" indent="0" algn="l" rtl="0">
+              <a:lnSpc>
+                <a:spcPct val="115000"/>
+              </a:lnSpc>
+              <a:spcBef>
+                <a:spcPts val="0"/>
+              </a:spcBef>
+              <a:spcAft>
+                <a:spcPts val="0"/>
+              </a:spcAft>
+              <a:buClr>
+                <a:schemeClr val="dk1"/>
+              </a:buClr>
+              <a:buSzPts val="1100"/>
+              <a:buFont typeface="Arial"/>
+              <a:buNone/>
+            </a:pPr>
+            <a:r>
+              <a:rPr lang="en-US" sz="1000" b="1" dirty="0">
+                <a:solidFill>
+                  <a:schemeClr val="dk1"/>
+                </a:solidFill>
+              </a:rPr>
+              <a:t>Testing</a:t>
+            </a:r>
+            <a:r>
+              <a:rPr lang="en-US" sz="1000" dirty="0">
+                <a:solidFill>
+                  <a:schemeClr val="dk1"/>
+                </a:solidFill>
+              </a:rPr>
+              <a:t>: A viral test checks specimens from your nose or your mouth to find out if you are currently infected with the virus</a:t>
+            </a:r>
+          </a:p>
+          <a:p>
+            <a:pPr marL="0" lvl="0" indent="0" algn="l" rtl="0">
+              <a:lnSpc>
+                <a:spcPct val="115000"/>
+              </a:lnSpc>
+              <a:spcBef>
+                <a:spcPts val="600"/>
+              </a:spcBef>
+              <a:spcAft>
+                <a:spcPts val="0"/>
+              </a:spcAft>
+              <a:buClr>
+                <a:schemeClr val="dk1"/>
+              </a:buClr>
+              <a:buSzPts val="1100"/>
+              <a:buFont typeface="Arial"/>
+              <a:buNone/>
+            </a:pPr>
+            <a:r>
+              <a:rPr lang="en-US" sz="1000" b="1" dirty="0">
+                <a:solidFill>
+                  <a:schemeClr val="dk1"/>
+                </a:solidFill>
+              </a:rPr>
+              <a:t>Diagnosis</a:t>
+            </a:r>
+            <a:r>
+              <a:rPr lang="en-US" sz="1000" dirty="0">
+                <a:solidFill>
+                  <a:schemeClr val="dk1"/>
+                </a:solidFill>
+              </a:rPr>
+              <a:t>: Medical diagnosis on infection of the virus in the disease outbreak</a:t>
+            </a:r>
+          </a:p>
+          <a:p>
+            <a:pPr marL="0" lvl="0" indent="0" algn="l" rtl="0">
+              <a:lnSpc>
+                <a:spcPct val="115000"/>
+              </a:lnSpc>
+              <a:spcBef>
+                <a:spcPts val="600"/>
+              </a:spcBef>
+              <a:spcAft>
+                <a:spcPts val="0"/>
+              </a:spcAft>
+              <a:buClr>
+                <a:schemeClr val="dk1"/>
+              </a:buClr>
+              <a:buSzPts val="1100"/>
+              <a:buFont typeface="Arial"/>
+              <a:buNone/>
+            </a:pPr>
+            <a:r>
+              <a:rPr lang="en-US" sz="1000" b="1" dirty="0" err="1">
+                <a:solidFill>
+                  <a:schemeClr val="dk1"/>
+                </a:solidFill>
+              </a:rPr>
+              <a:t>IdentifyDiseaseSource</a:t>
+            </a:r>
+            <a:r>
+              <a:rPr lang="en-US" sz="1000" dirty="0">
+                <a:solidFill>
+                  <a:schemeClr val="dk1"/>
+                </a:solidFill>
+              </a:rPr>
+              <a:t>: Identify the source of the disease and name the disease if unknown.</a:t>
+            </a:r>
+          </a:p>
+          <a:p>
+            <a:pPr marL="0" lvl="0" indent="0" algn="l" rtl="0">
+              <a:lnSpc>
+                <a:spcPct val="115000"/>
+              </a:lnSpc>
+              <a:spcBef>
+                <a:spcPts val="600"/>
+              </a:spcBef>
+              <a:spcAft>
+                <a:spcPts val="0"/>
+              </a:spcAft>
+              <a:buClr>
+                <a:schemeClr val="dk1"/>
+              </a:buClr>
+              <a:buSzPts val="1100"/>
+              <a:buFont typeface="Arial"/>
+              <a:buNone/>
+            </a:pPr>
+            <a:r>
+              <a:rPr lang="en-US" sz="1000" b="1" dirty="0">
+                <a:solidFill>
+                  <a:schemeClr val="dk1"/>
+                </a:solidFill>
+              </a:rPr>
+              <a:t>Quarantine: </a:t>
+            </a:r>
+            <a:r>
+              <a:rPr lang="en" sz="1000" dirty="0">
+                <a:solidFill>
+                  <a:schemeClr val="dk1"/>
+                </a:solidFill>
+              </a:rPr>
+              <a:t>Restriction on the movement of people, animals and goods which is intended to prevent the spread of the disease</a:t>
+            </a:r>
+            <a:endParaRPr lang="en-US" sz="1000" dirty="0">
+              <a:solidFill>
+                <a:schemeClr val="dk1"/>
+              </a:solidFill>
+            </a:endParaRPr>
+          </a:p>
+          <a:p>
+            <a:pPr marL="0" lvl="0" indent="0" algn="l" rtl="0">
+              <a:lnSpc>
+                <a:spcPct val="115000"/>
+              </a:lnSpc>
+              <a:spcBef>
+                <a:spcPts val="600"/>
+              </a:spcBef>
+              <a:spcAft>
+                <a:spcPts val="0"/>
+              </a:spcAft>
+              <a:buClr>
+                <a:schemeClr val="dk1"/>
+              </a:buClr>
+              <a:buSzPts val="1100"/>
+              <a:buFont typeface="Arial"/>
+              <a:buNone/>
+            </a:pPr>
+            <a:r>
+              <a:rPr lang="en-US" sz="1000" b="1" dirty="0">
+                <a:solidFill>
+                  <a:schemeClr val="dk1"/>
+                </a:solidFill>
+              </a:rPr>
+              <a:t>Disinfect: </a:t>
+            </a:r>
+            <a:r>
+              <a:rPr lang="en-US" sz="1000" dirty="0">
+                <a:solidFill>
+                  <a:schemeClr val="dk1"/>
+                </a:solidFill>
+              </a:rPr>
+              <a:t>Cleaning surfaces and substances that are within contact of the pathogen</a:t>
+            </a:r>
+          </a:p>
+          <a:p>
+            <a:pPr marL="0" lvl="0" indent="0" algn="l" rtl="0">
+              <a:lnSpc>
+                <a:spcPct val="115000"/>
+              </a:lnSpc>
+              <a:spcBef>
+                <a:spcPts val="600"/>
+              </a:spcBef>
+              <a:spcAft>
+                <a:spcPts val="600"/>
+              </a:spcAft>
+              <a:buNone/>
+            </a:pPr>
+            <a:r>
+              <a:rPr lang="en-US" sz="1000" b="1" dirty="0">
+                <a:solidFill>
+                  <a:schemeClr val="dk1"/>
+                </a:solidFill>
+              </a:rPr>
+              <a:t>Treatment</a:t>
+            </a:r>
+            <a:r>
+              <a:rPr lang="en-US" sz="1000" dirty="0">
+                <a:solidFill>
+                  <a:schemeClr val="dk1"/>
+                </a:solidFill>
+              </a:rPr>
+              <a:t>: Attempted remediation of a health problem due to infection of the virus in the disease outbreak</a:t>
+            </a:r>
+          </a:p>
+          <a:p>
+            <a:pPr marL="0" lvl="0" indent="0" algn="l" rtl="0">
+              <a:lnSpc>
+                <a:spcPct val="115000"/>
+              </a:lnSpc>
+              <a:spcBef>
+                <a:spcPts val="600"/>
+              </a:spcBef>
+              <a:spcAft>
+                <a:spcPts val="600"/>
+              </a:spcAft>
+              <a:buNone/>
+            </a:pPr>
+            <a:r>
+              <a:rPr lang="en-US" sz="1000" b="1" dirty="0">
+                <a:solidFill>
+                  <a:schemeClr val="dk1"/>
+                </a:solidFill>
+              </a:rPr>
+              <a:t>Illness Outcome</a:t>
+            </a:r>
+            <a:r>
+              <a:rPr lang="en-US" sz="1000" dirty="0">
+                <a:solidFill>
+                  <a:schemeClr val="dk1"/>
+                </a:solidFill>
+              </a:rPr>
+              <a:t>:</a:t>
+            </a:r>
+            <a:r>
+              <a:rPr lang="zh-CN" altLang="en-US" sz="1000" dirty="0">
+                <a:solidFill>
+                  <a:schemeClr val="dk1"/>
+                </a:solidFill>
+              </a:rPr>
+              <a:t> </a:t>
+            </a:r>
+            <a:r>
+              <a:rPr lang="en-US" altLang="zh-CN" sz="1000" dirty="0">
+                <a:solidFill>
+                  <a:schemeClr val="dk1"/>
+                </a:solidFill>
+              </a:rPr>
+              <a:t>XOR</a:t>
+            </a:r>
+            <a:r>
+              <a:rPr lang="zh-CN" altLang="en-US" sz="1000" dirty="0">
+                <a:solidFill>
+                  <a:schemeClr val="dk1"/>
+                </a:solidFill>
+              </a:rPr>
+              <a:t> </a:t>
+            </a:r>
+            <a:r>
+              <a:rPr lang="en-US" altLang="zh-CN" sz="1000" dirty="0">
+                <a:solidFill>
+                  <a:schemeClr val="dk1"/>
+                </a:solidFill>
+              </a:rPr>
+              <a:t>relation between Recover and Death </a:t>
+            </a:r>
+            <a:r>
+              <a:rPr lang="en-US" sz="1000" dirty="0">
+                <a:solidFill>
+                  <a:schemeClr val="dk1"/>
+                </a:solidFill>
+              </a:rPr>
+              <a:t> </a:t>
+            </a:r>
+          </a:p>
+        </p:txBody>
+      </p:sp>
+      <p:cxnSp>
+        <p:nvCxnSpPr>
+          <p:cNvPr id="8" name="Straight Arrow Connector 7">
+            <a:extLst>
+              <a:ext uri="{FF2B5EF4-FFF2-40B4-BE49-F238E27FC236}">
+                <a16:creationId xmlns:a16="http://schemas.microsoft.com/office/drawing/2014/main" id="{9A31A866-956B-FE76-17B5-0EE0F6FAC218}"/>
+              </a:ext>
+            </a:extLst>
+          </p:cNvPr>
+          <p:cNvCxnSpPr>
+            <a:cxnSpLocks/>
+          </p:cNvCxnSpPr>
+          <p:nvPr/>
+        </p:nvCxnSpPr>
+        <p:spPr>
+          <a:xfrm flipH="1" flipV="1">
+            <a:off x="8515847" y="477078"/>
+            <a:ext cx="63610" cy="1319917"/>
+          </a:xfrm>
+          <a:prstGeom prst="straightConnector1">
+            <a:avLst/>
+          </a:prstGeom>
+          <a:ln w="12700">
+            <a:tailEnd type="triangle"/>
+          </a:ln>
+        </p:spPr>
+        <p:style>
+          <a:lnRef idx="1">
+            <a:schemeClr val="accent2"/>
+          </a:lnRef>
+          <a:fillRef idx="0">
+            <a:schemeClr val="accent2"/>
+          </a:fillRef>
+          <a:effectRef idx="0">
+            <a:schemeClr val="accent2"/>
+          </a:effectRef>
+          <a:fontRef idx="minor">
+            <a:schemeClr val="tx1"/>
+          </a:fontRef>
+        </p:style>
+      </p:cxnSp>
+    </p:spTree>
+    <p:extLst>
+      <p:ext uri="{BB962C8B-B14F-4D97-AF65-F5344CB8AC3E}">
+        <p14:creationId xmlns:p14="http://schemas.microsoft.com/office/powerpoint/2010/main" val="454517899"/>
+      </p:ext>
+    </p:extLst>
+  </p:cSld>
+  <p:clrMapOvr>
+    <a:masterClrMapping/>
+  </p:clrMapOvr>
+</p:sld>
+</file>
+
+<file path=ppt/slides/slide7.xml><?xml version="1.0" encoding="utf-8"?>
 <p:sld xmlns:a="http://schemas.openxmlformats.org/drawingml/2006/main" xmlns:r="http://schemas.openxmlformats.org/officeDocument/2006/relationships" xmlns:p="http://schemas.openxmlformats.org/presentationml/2006/main">
   <p:cSld>
     <p:spTree>
@@ -13395,175 +13365,9 @@
             </a:pPr>
             <a:r>
               <a:rPr lang="en" dirty="0"/>
-              <a:t>Medical Response</a:t>
+              <a:t>Medical Response (cont.) </a:t>
             </a:r>
             <a:endParaRPr dirty="0"/>
-          </a:p>
-        </p:txBody>
-      </p:sp>
-      <p:sp>
-        <p:nvSpPr>
-          <p:cNvPr id="88" name="Google Shape;88;p6"/>
-          <p:cNvSpPr txBox="1"/>
-          <p:nvPr/>
-        </p:nvSpPr>
-        <p:spPr>
-          <a:xfrm>
-            <a:off x="275980" y="499876"/>
-            <a:ext cx="8520600" cy="1235693"/>
-          </a:xfrm>
-          <a:prstGeom prst="rect">
-            <a:avLst/>
-          </a:prstGeom>
-          <a:noFill/>
-          <a:ln>
-            <a:noFill/>
-          </a:ln>
-        </p:spPr>
-        <p:txBody>
-          <a:bodyPr spcFirstLastPara="1" wrap="square" lIns="91425" tIns="91425" rIns="91425" bIns="91425" anchor="t" anchorCtr="0">
-            <a:spAutoFit/>
-          </a:bodyPr>
-          <a:lstStyle/>
-          <a:p>
-            <a:pPr marL="0" lvl="0" indent="0" algn="l" rtl="0">
-              <a:lnSpc>
-                <a:spcPct val="115000"/>
-              </a:lnSpc>
-              <a:spcBef>
-                <a:spcPts val="0"/>
-              </a:spcBef>
-              <a:spcAft>
-                <a:spcPts val="0"/>
-              </a:spcAft>
-              <a:buClr>
-                <a:schemeClr val="dk1"/>
-              </a:buClr>
-              <a:buSzPts val="1100"/>
-              <a:buFont typeface="Arial"/>
-              <a:buNone/>
-            </a:pPr>
-            <a:r>
-              <a:rPr lang="en" sz="1050" b="1" dirty="0">
-                <a:solidFill>
-                  <a:schemeClr val="dk1"/>
-                </a:solidFill>
-              </a:rPr>
-              <a:t>Testing</a:t>
-            </a:r>
-            <a:r>
-              <a:rPr lang="en" sz="1050" dirty="0">
-                <a:solidFill>
-                  <a:schemeClr val="dk1"/>
-                </a:solidFill>
-              </a:rPr>
-              <a:t>: A viral test checks specimens from your nose or your mouth to find out if you are currently infected with the virus</a:t>
-            </a:r>
-            <a:endParaRPr sz="1050" dirty="0">
-              <a:solidFill>
-                <a:schemeClr val="dk1"/>
-              </a:solidFill>
-            </a:endParaRPr>
-          </a:p>
-          <a:p>
-            <a:pPr marL="0" lvl="0" indent="0" algn="l" rtl="0">
-              <a:lnSpc>
-                <a:spcPct val="115000"/>
-              </a:lnSpc>
-              <a:spcBef>
-                <a:spcPts val="600"/>
-              </a:spcBef>
-              <a:spcAft>
-                <a:spcPts val="0"/>
-              </a:spcAft>
-              <a:buClr>
-                <a:schemeClr val="dk1"/>
-              </a:buClr>
-              <a:buSzPts val="1100"/>
-              <a:buFont typeface="Arial"/>
-              <a:buNone/>
-            </a:pPr>
-            <a:r>
-              <a:rPr lang="en" sz="1050" b="1" dirty="0">
-                <a:solidFill>
-                  <a:schemeClr val="dk1"/>
-                </a:solidFill>
-              </a:rPr>
-              <a:t>Diagnosis</a:t>
-            </a:r>
-            <a:r>
-              <a:rPr lang="en" sz="1050" dirty="0">
-                <a:solidFill>
-                  <a:schemeClr val="dk1"/>
-                </a:solidFill>
-              </a:rPr>
-              <a:t>: Medical diagnosis on infection of the virus in the disease outbreak</a:t>
-            </a:r>
-          </a:p>
-          <a:p>
-            <a:pPr marL="0" lvl="0" indent="0" algn="l" rtl="0">
-              <a:lnSpc>
-                <a:spcPct val="115000"/>
-              </a:lnSpc>
-              <a:spcBef>
-                <a:spcPts val="600"/>
-              </a:spcBef>
-              <a:spcAft>
-                <a:spcPts val="0"/>
-              </a:spcAft>
-              <a:buClr>
-                <a:schemeClr val="dk1"/>
-              </a:buClr>
-              <a:buSzPts val="1100"/>
-              <a:buFont typeface="Arial"/>
-              <a:buNone/>
-            </a:pPr>
-            <a:r>
-              <a:rPr lang="en" sz="1050" b="1" dirty="0">
-                <a:solidFill>
-                  <a:schemeClr val="dk1"/>
-                </a:solidFill>
-              </a:rPr>
-              <a:t>Disinfect: </a:t>
-            </a:r>
-            <a:r>
-              <a:rPr lang="en" sz="1050" dirty="0">
-                <a:solidFill>
-                  <a:schemeClr val="dk1"/>
-                </a:solidFill>
-              </a:rPr>
-              <a:t>Cleaning surfaces and substances that are within contact of the pathogen</a:t>
-            </a:r>
-          </a:p>
-          <a:p>
-            <a:pPr marL="0" lvl="0" indent="0" algn="l" rtl="0">
-              <a:lnSpc>
-                <a:spcPct val="115000"/>
-              </a:lnSpc>
-              <a:spcBef>
-                <a:spcPts val="600"/>
-              </a:spcBef>
-              <a:spcAft>
-                <a:spcPts val="600"/>
-              </a:spcAft>
-              <a:buNone/>
-            </a:pPr>
-            <a:r>
-              <a:rPr lang="en" sz="1050" b="1" dirty="0">
-                <a:solidFill>
-                  <a:schemeClr val="dk1"/>
-                </a:solidFill>
-              </a:rPr>
-              <a:t>Treatment</a:t>
-            </a:r>
-            <a:r>
-              <a:rPr lang="en" sz="1050" dirty="0">
-                <a:solidFill>
-                  <a:schemeClr val="dk1"/>
-                </a:solidFill>
-              </a:rPr>
-              <a:t>: Attempted remediation of a health problem due to infection of the virus in the disease outbreak</a:t>
-            </a:r>
           </a:p>
         </p:txBody>
       </p:sp>
@@ -13575,8 +13379,8 @@
         </p:nvSpPr>
         <p:spPr>
           <a:xfrm>
-            <a:off x="254910" y="1401346"/>
-            <a:ext cx="8634180" cy="1498457"/>
+            <a:off x="114375" y="742441"/>
+            <a:ext cx="2798857" cy="3991062"/>
           </a:xfrm>
           <a:prstGeom prst="rect">
             <a:avLst/>
@@ -13620,164 +13424,170 @@
               </a:rPr>
               <a:t>Contact tracing identifies persons who may have come into contact with an infected person during the disease outbreak</a:t>
             </a:r>
+          </a:p>
+          <a:p>
+            <a:pPr>
+              <a:lnSpc>
+                <a:spcPct val="115000"/>
+              </a:lnSpc>
+              <a:spcBef>
+                <a:spcPts val="600"/>
+              </a:spcBef>
+              <a:buClr>
+                <a:schemeClr val="dk1"/>
+              </a:buClr>
+              <a:buSzPts val="1100"/>
+            </a:pPr>
+            <a:r>
+              <a:rPr lang="en-US" sz="1050" b="1" dirty="0">
+                <a:solidFill>
+                  <a:schemeClr val="dk1"/>
+                </a:solidFill>
+              </a:rPr>
+              <a:t>Gather Data: </a:t>
+            </a:r>
+            <a:r>
+              <a:rPr lang="en-US" sz="1050" dirty="0">
+                <a:solidFill>
+                  <a:schemeClr val="dk1"/>
+                </a:solidFill>
+              </a:rPr>
+              <a:t>Epidemiologic data collection</a:t>
+            </a:r>
+          </a:p>
+          <a:p>
+            <a:pPr>
+              <a:lnSpc>
+                <a:spcPct val="115000"/>
+              </a:lnSpc>
+              <a:spcBef>
+                <a:spcPts val="600"/>
+              </a:spcBef>
+              <a:buClr>
+                <a:schemeClr val="dk1"/>
+              </a:buClr>
+              <a:buSzPts val="1100"/>
+            </a:pPr>
+            <a:r>
+              <a:rPr lang="en-US" sz="1050" b="1" dirty="0">
+                <a:solidFill>
+                  <a:schemeClr val="dk1"/>
+                </a:solidFill>
+              </a:rPr>
+              <a:t>Analyze Data</a:t>
+            </a:r>
+            <a:r>
+              <a:rPr lang="en-US" sz="1050" dirty="0">
+                <a:solidFill>
+                  <a:schemeClr val="dk1"/>
+                </a:solidFill>
+              </a:rPr>
+              <a:t>: process of applying analytical methods to existing data of a specific type</a:t>
+            </a:r>
+          </a:p>
+          <a:p>
+            <a:pPr>
+              <a:lnSpc>
+                <a:spcPct val="115000"/>
+              </a:lnSpc>
+              <a:spcBef>
+                <a:spcPts val="600"/>
+              </a:spcBef>
+              <a:buClr>
+                <a:schemeClr val="dk1"/>
+              </a:buClr>
+              <a:buSzPts val="1100"/>
+            </a:pPr>
+            <a:r>
+              <a:rPr lang="en-US" sz="1050" b="1" dirty="0">
+                <a:solidFill>
+                  <a:schemeClr val="dk1"/>
+                </a:solidFill>
+              </a:rPr>
+              <a:t>Collect Lab Samples: </a:t>
+            </a:r>
+            <a:r>
+              <a:rPr lang="en-US" sz="1050" dirty="0">
+                <a:solidFill>
+                  <a:schemeClr val="dk1"/>
+                </a:solidFill>
+              </a:rPr>
+              <a:t>Collecting and processing samples with the pathogen. These samples may not from the patient directly, but include food, water, surfaces, animals etc.</a:t>
+            </a:r>
+          </a:p>
+          <a:p>
+            <a:pPr>
+              <a:lnSpc>
+                <a:spcPct val="115000"/>
+              </a:lnSpc>
+              <a:spcBef>
+                <a:spcPts val="600"/>
+              </a:spcBef>
+              <a:buClr>
+                <a:schemeClr val="dk1"/>
+              </a:buClr>
+              <a:buSzPts val="1100"/>
+            </a:pPr>
+            <a:r>
+              <a:rPr lang="en-US" sz="1050" b="1" dirty="0">
+                <a:solidFill>
+                  <a:schemeClr val="dk1"/>
+                </a:solidFill>
+              </a:rPr>
+              <a:t>Identify Exposed People: </a:t>
+            </a:r>
+            <a:r>
+              <a:rPr lang="en-US" sz="1050" dirty="0">
+                <a:solidFill>
+                  <a:schemeClr val="dk1"/>
+                </a:solidFill>
+              </a:rPr>
+              <a:t>Identify people exposed to the virus or came into contact with the infected person.</a:t>
+            </a:r>
+          </a:p>
+          <a:p>
+            <a:pPr>
+              <a:lnSpc>
+                <a:spcPct val="115000"/>
+              </a:lnSpc>
+              <a:spcBef>
+                <a:spcPts val="600"/>
+              </a:spcBef>
+              <a:buClr>
+                <a:schemeClr val="dk1"/>
+              </a:buClr>
+              <a:buSzPts val="1100"/>
+            </a:pPr>
+            <a:r>
+              <a:rPr lang="en-US" sz="1050" b="1" dirty="0">
+                <a:solidFill>
+                  <a:schemeClr val="dk1"/>
+                </a:solidFill>
+              </a:rPr>
+              <a:t>Quarantine Exposed Group: </a:t>
+            </a:r>
+            <a:r>
+              <a:rPr lang="en-US" sz="1050" dirty="0">
+                <a:solidFill>
+                  <a:schemeClr val="dk1"/>
+                </a:solidFill>
+              </a:rPr>
+              <a:t>Quarantine and monitor people who came into contact with the infected person.</a:t>
+            </a:r>
             <a:endParaRPr lang="en" sz="1050" dirty="0">
               <a:solidFill>
                 <a:schemeClr val="dk1"/>
               </a:solidFill>
             </a:endParaRPr>
           </a:p>
-          <a:p>
-            <a:pPr marL="0" lvl="0" indent="0" algn="l" rtl="0">
-              <a:lnSpc>
-                <a:spcPct val="115000"/>
-              </a:lnSpc>
-              <a:spcBef>
-                <a:spcPts val="600"/>
-              </a:spcBef>
-              <a:spcAft>
-                <a:spcPts val="0"/>
-              </a:spcAft>
-              <a:buClr>
-                <a:schemeClr val="dk1"/>
-              </a:buClr>
-              <a:buSzPts val="1100"/>
-              <a:buFont typeface="Arial"/>
-              <a:buNone/>
-            </a:pPr>
-            <a:r>
-              <a:rPr lang="en" sz="1050" b="1" dirty="0">
-                <a:solidFill>
-                  <a:schemeClr val="dk1"/>
-                </a:solidFill>
-              </a:rPr>
-              <a:t>Quarantine</a:t>
-            </a:r>
-            <a:r>
-              <a:rPr lang="en" sz="1050" dirty="0">
-                <a:solidFill>
-                  <a:schemeClr val="dk1"/>
-                </a:solidFill>
-              </a:rPr>
-              <a:t>: Restriction on the movement of people, animals and goods which is intended to prevent the spread of the disease</a:t>
-            </a:r>
-            <a:endParaRPr sz="1050" dirty="0">
-              <a:solidFill>
-                <a:schemeClr val="dk1"/>
-              </a:solidFill>
-            </a:endParaRPr>
-          </a:p>
-          <a:p>
-            <a:pPr marL="0" lvl="0" indent="0" algn="l" rtl="0">
-              <a:lnSpc>
-                <a:spcPct val="115000"/>
-              </a:lnSpc>
-              <a:spcBef>
-                <a:spcPts val="600"/>
-              </a:spcBef>
-              <a:spcAft>
-                <a:spcPts val="0"/>
-              </a:spcAft>
-              <a:buClr>
-                <a:schemeClr val="dk1"/>
-              </a:buClr>
-              <a:buSzPts val="1100"/>
-              <a:buFont typeface="Arial"/>
-              <a:buNone/>
-            </a:pPr>
-            <a:r>
-              <a:rPr lang="en" sz="1050" b="1" dirty="0">
-                <a:solidFill>
-                  <a:schemeClr val="dk1"/>
-                </a:solidFill>
-              </a:rPr>
-              <a:t>Illness Outcome: </a:t>
-            </a:r>
-            <a:r>
-              <a:rPr lang="en" sz="1050" dirty="0">
-                <a:solidFill>
-                  <a:schemeClr val="dk1"/>
-                </a:solidFill>
-              </a:rPr>
-              <a:t>an XOR gate connecting the following two outcomes</a:t>
-            </a:r>
-          </a:p>
-          <a:p>
-            <a:pPr marL="0" lvl="0" indent="0" algn="l" rtl="0">
-              <a:lnSpc>
-                <a:spcPct val="115000"/>
-              </a:lnSpc>
-              <a:spcBef>
-                <a:spcPts val="600"/>
-              </a:spcBef>
-              <a:spcAft>
-                <a:spcPts val="0"/>
-              </a:spcAft>
-              <a:buClr>
-                <a:schemeClr val="dk1"/>
-              </a:buClr>
-              <a:buSzPts val="1100"/>
-              <a:buFont typeface="Arial"/>
-              <a:buNone/>
-            </a:pPr>
-            <a:r>
-              <a:rPr lang="en" sz="1050" b="1" dirty="0">
-                <a:solidFill>
-                  <a:schemeClr val="dk1"/>
-                </a:solidFill>
-              </a:rPr>
-              <a:t>- Die </a:t>
-            </a:r>
-            <a:r>
-              <a:rPr lang="en" sz="1050" b="1" dirty="0">
-                <a:solidFill>
-                  <a:schemeClr val="dk1"/>
-                </a:solidFill>
-                <a:sym typeface="Wingdings" pitchFamily="2" charset="2"/>
-              </a:rPr>
-              <a:t> Funeral</a:t>
-            </a:r>
-            <a:endParaRPr sz="1050" dirty="0">
-              <a:solidFill>
-                <a:schemeClr val="dk1"/>
-              </a:solidFill>
-            </a:endParaRPr>
-          </a:p>
-          <a:p>
-            <a:pPr marL="0" lvl="0" indent="0" algn="l" rtl="0">
-              <a:lnSpc>
-                <a:spcPct val="115000"/>
-              </a:lnSpc>
-              <a:spcBef>
-                <a:spcPts val="600"/>
-              </a:spcBef>
-              <a:spcAft>
-                <a:spcPts val="0"/>
-              </a:spcAft>
-              <a:buClr>
-                <a:schemeClr val="dk1"/>
-              </a:buClr>
-              <a:buSzPts val="1100"/>
-              <a:buFont typeface="Arial"/>
-              <a:buNone/>
-            </a:pPr>
-            <a:r>
-              <a:rPr lang="en" sz="1050" b="1" dirty="0">
-                <a:solidFill>
-                  <a:schemeClr val="dk1"/>
-                </a:solidFill>
-              </a:rPr>
-              <a:t>- Recover</a:t>
-            </a:r>
-            <a:endParaRPr dirty="0"/>
-          </a:p>
         </p:txBody>
       </p:sp>
       <p:pic>
         <p:nvPicPr>
-          <p:cNvPr id="3" name="Picture 2">
+          <p:cNvPr id="8" name="Picture 7">
             <a:extLst>
               <a:ext uri="{FF2B5EF4-FFF2-40B4-BE49-F238E27FC236}">
-                <a16:creationId xmlns:a16="http://schemas.microsoft.com/office/drawing/2014/main" id="{50BC770D-5893-2869-C131-A19592698F48}"/>
+                <a16:creationId xmlns:a16="http://schemas.microsoft.com/office/drawing/2014/main" id="{68D91A13-D0C5-AF5D-9D75-844AA7B97B1C}"/>
               </a:ext>
             </a:extLst>
           </p:cNvPr>
@@ -13794,14 +13604,55 @@
         </p:blipFill>
         <p:spPr>
           <a:xfrm>
-            <a:off x="249416" y="2581064"/>
-            <a:ext cx="8547164" cy="2236434"/>
+            <a:off x="2913233" y="0"/>
+            <a:ext cx="6116391" cy="5143500"/>
           </a:xfrm>
           <a:prstGeom prst="rect">
             <a:avLst/>
           </a:prstGeom>
         </p:spPr>
       </p:pic>
+      <p:cxnSp>
+        <p:nvCxnSpPr>
+          <p:cNvPr id="9" name="Straight Arrow Connector 8">
+            <a:extLst>
+              <a:ext uri="{FF2B5EF4-FFF2-40B4-BE49-F238E27FC236}">
+                <a16:creationId xmlns:a16="http://schemas.microsoft.com/office/drawing/2014/main" id="{CB09F9A5-C1F1-BE73-98FB-1E0511FD1A2C}"/>
+              </a:ext>
+            </a:extLst>
+          </p:cNvPr>
+          <p:cNvCxnSpPr>
+            <a:cxnSpLocks/>
+          </p:cNvCxnSpPr>
+          <p:nvPr/>
+        </p:nvCxnSpPr>
+        <p:spPr>
+          <a:xfrm flipH="1" flipV="1">
+            <a:off x="8515847" y="477078"/>
+            <a:ext cx="63610" cy="1319917"/>
+          </a:xfrm>
+          <a:prstGeom prst="straightConnector1">
+            <a:avLst/>
+          </a:prstGeom>
+          <a:ln w="12700">
+            <a:tailEnd type="triangle"/>
+          </a:ln>
+        </p:spPr>
+        <p:style>
+          <a:lnRef idx="1">
+            <a:schemeClr val="accent2"/>
+          </a:lnRef>
+          <a:fillRef idx="0">
+            <a:schemeClr val="accent2"/>
+          </a:fillRef>
+          <a:effectRef idx="0">
+            <a:schemeClr val="accent2"/>
+          </a:effectRef>
+          <a:fontRef idx="minor">
+            <a:schemeClr val="tx1"/>
+          </a:fontRef>
+        </p:style>
+      </p:cxnSp>
     </p:spTree>
   </p:cSld>
   <p:clrMapOvr>
@@ -13810,523 +13661,7 @@
 </p:sld>
 </file>
 
-<file path=ppt/slides/slide7.xml><?xml version="1.0" encoding="utf-8"?>
-<p:sld xmlns:a="http://schemas.openxmlformats.org/drawingml/2006/main" xmlns:r="http://schemas.openxmlformats.org/officeDocument/2006/relationships" xmlns:p="http://schemas.openxmlformats.org/presentationml/2006/main">
-  <p:cSld>
-    <p:spTree>
-      <p:nvGrpSpPr>
-        <p:cNvPr id="1" name=""/>
-        <p:cNvGrpSpPr/>
-        <p:nvPr/>
-      </p:nvGrpSpPr>
-      <p:grpSpPr>
-        <a:xfrm>
-          <a:off x="0" y="0"/>
-          <a:ext cx="0" cy="0"/>
-          <a:chOff x="0" y="0"/>
-          <a:chExt cx="0" cy="0"/>
-        </a:xfrm>
-      </p:grpSpPr>
-      <p:sp>
-        <p:nvSpPr>
-          <p:cNvPr id="2" name="Title 1">
-            <a:extLst>
-              <a:ext uri="{FF2B5EF4-FFF2-40B4-BE49-F238E27FC236}">
-                <a16:creationId xmlns:a16="http://schemas.microsoft.com/office/drawing/2014/main" id="{3339F325-F804-8561-4476-52A9C1C3F21A}"/>
-              </a:ext>
-            </a:extLst>
-          </p:cNvPr>
-          <p:cNvSpPr>
-            <a:spLocks noGrp="1"/>
-          </p:cNvSpPr>
-          <p:nvPr>
-            <p:ph type="title"/>
-          </p:nvPr>
-        </p:nvSpPr>
-        <p:spPr/>
-        <p:txBody>
-          <a:bodyPr>
-            <a:normAutofit fontScale="90000"/>
-          </a:bodyPr>
-          <a:lstStyle/>
-          <a:p>
-            <a:r>
-              <a:rPr lang="en-US" dirty="0"/>
-              <a:t>Medical Response cont.</a:t>
-            </a:r>
-          </a:p>
-        </p:txBody>
-      </p:sp>
-      <p:sp>
-        <p:nvSpPr>
-          <p:cNvPr id="3" name="Text Placeholder 2">
-            <a:extLst>
-              <a:ext uri="{FF2B5EF4-FFF2-40B4-BE49-F238E27FC236}">
-                <a16:creationId xmlns:a16="http://schemas.microsoft.com/office/drawing/2014/main" id="{78853270-2CDD-67A5-F642-F5DDEE1D23B8}"/>
-              </a:ext>
-            </a:extLst>
-          </p:cNvPr>
-          <p:cNvSpPr>
-            <a:spLocks noGrp="1"/>
-          </p:cNvSpPr>
-          <p:nvPr>
-            <p:ph type="body" idx="1"/>
-          </p:nvPr>
-        </p:nvSpPr>
-        <p:spPr>
-          <a:xfrm>
-            <a:off x="311700" y="1017725"/>
-            <a:ext cx="8355222" cy="3416400"/>
-          </a:xfrm>
-        </p:spPr>
-        <p:txBody>
-          <a:bodyPr>
-            <a:normAutofit/>
-          </a:bodyPr>
-          <a:lstStyle/>
-          <a:p>
-            <a:r>
-              <a:rPr lang="en-US" sz="1200" dirty="0">
-                <a:latin typeface="+mn-lt"/>
-              </a:rPr>
-              <a:t>After </a:t>
-            </a:r>
-            <a:r>
-              <a:rPr lang="en-US" sz="1200" b="1" dirty="0">
-                <a:latin typeface="+mn-lt"/>
-              </a:rPr>
-              <a:t>tracing</a:t>
-            </a:r>
-            <a:r>
-              <a:rPr lang="en-US" sz="1200" dirty="0">
-                <a:latin typeface="+mn-lt"/>
-              </a:rPr>
-              <a:t>, an extra group of exposed people could be </a:t>
-            </a:r>
-            <a:r>
-              <a:rPr lang="en-US" sz="1200" b="1" dirty="0">
-                <a:latin typeface="+mn-lt"/>
-              </a:rPr>
-              <a:t>identified </a:t>
-            </a:r>
-            <a:r>
-              <a:rPr lang="en-US" sz="1200" dirty="0">
-                <a:latin typeface="+mn-lt"/>
-              </a:rPr>
-              <a:t>and </a:t>
-            </a:r>
-            <a:r>
-              <a:rPr lang="en-US" sz="1200" b="1" dirty="0">
-                <a:latin typeface="+mn-lt"/>
-              </a:rPr>
-              <a:t>quarantined.</a:t>
-            </a:r>
-          </a:p>
-          <a:p>
-            <a:r>
-              <a:rPr lang="en-US" sz="1200" dirty="0">
-                <a:latin typeface="+mn-lt"/>
-              </a:rPr>
-              <a:t>After </a:t>
-            </a:r>
-            <a:r>
-              <a:rPr lang="en-US" sz="1200" b="1" dirty="0">
-                <a:latin typeface="+mn-lt"/>
-              </a:rPr>
-              <a:t>tracing </a:t>
-            </a:r>
-            <a:r>
-              <a:rPr lang="en-US" sz="1200" dirty="0">
-                <a:latin typeface="+mn-lt"/>
-              </a:rPr>
-              <a:t>the pathogen, </a:t>
-            </a:r>
-            <a:r>
-              <a:rPr lang="en-US" sz="1200" b="1" dirty="0">
-                <a:latin typeface="+mn-lt"/>
-              </a:rPr>
-              <a:t>collecting lab samples</a:t>
-            </a:r>
-            <a:r>
-              <a:rPr lang="en-US" sz="1200" dirty="0">
-                <a:latin typeface="+mn-lt"/>
-              </a:rPr>
-              <a:t> (and performing lab tests), </a:t>
-            </a:r>
-            <a:r>
-              <a:rPr lang="en-US" sz="1200" b="1" dirty="0">
-                <a:latin typeface="+mn-lt"/>
-              </a:rPr>
-              <a:t>gathering and analyzing </a:t>
-            </a:r>
-            <a:r>
-              <a:rPr lang="en-US" sz="1200" dirty="0">
-                <a:latin typeface="+mn-lt"/>
-              </a:rPr>
-              <a:t>data, the disease is </a:t>
-            </a:r>
-            <a:r>
-              <a:rPr lang="en-US" sz="1200" b="1" dirty="0">
-                <a:latin typeface="+mn-lt"/>
-              </a:rPr>
-              <a:t>identified </a:t>
-            </a:r>
-            <a:r>
-              <a:rPr lang="en-US" sz="1200" dirty="0">
-                <a:latin typeface="+mn-lt"/>
-              </a:rPr>
-              <a:t>and announced. </a:t>
-            </a:r>
-          </a:p>
-        </p:txBody>
-      </p:sp>
-      <p:pic>
-        <p:nvPicPr>
-          <p:cNvPr id="5" name="Picture 4">
-            <a:extLst>
-              <a:ext uri="{FF2B5EF4-FFF2-40B4-BE49-F238E27FC236}">
-                <a16:creationId xmlns:a16="http://schemas.microsoft.com/office/drawing/2014/main" id="{91DB2C77-1747-2BEB-070D-3A54EE8B7011}"/>
-              </a:ext>
-            </a:extLst>
-          </p:cNvPr>
-          <p:cNvPicPr>
-            <a:picLocks noChangeAspect="1"/>
-          </p:cNvPicPr>
-          <p:nvPr/>
-        </p:nvPicPr>
-        <p:blipFill>
-          <a:blip r:embed="rId2"/>
-          <a:stretch>
-            <a:fillRect/>
-          </a:stretch>
-        </p:blipFill>
-        <p:spPr>
-          <a:xfrm>
-            <a:off x="1558456" y="2004610"/>
-            <a:ext cx="6027087" cy="3138890"/>
-          </a:xfrm>
-          <a:prstGeom prst="rect">
-            <a:avLst/>
-          </a:prstGeom>
-        </p:spPr>
-      </p:pic>
-    </p:spTree>
-    <p:extLst>
-      <p:ext uri="{BB962C8B-B14F-4D97-AF65-F5344CB8AC3E}">
-        <p14:creationId xmlns:p14="http://schemas.microsoft.com/office/powerpoint/2010/main" val="1544613773"/>
-      </p:ext>
-    </p:extLst>
-  </p:cSld>
-  <p:clrMapOvr>
-    <a:masterClrMapping/>
-  </p:clrMapOvr>
-</p:sld>
-</file>
-
 <file path=ppt/slides/slide8.xml><?xml version="1.0" encoding="utf-8"?>
-<p:sld xmlns:a="http://schemas.openxmlformats.org/drawingml/2006/main" xmlns:r="http://schemas.openxmlformats.org/officeDocument/2006/relationships" xmlns:p="http://schemas.openxmlformats.org/presentationml/2006/main">
-  <p:cSld>
-    <p:spTree>
-      <p:nvGrpSpPr>
-        <p:cNvPr id="1" name="Shape 79"/>
-        <p:cNvGrpSpPr/>
-        <p:nvPr/>
-      </p:nvGrpSpPr>
-      <p:grpSpPr>
-        <a:xfrm>
-          <a:off x="0" y="0"/>
-          <a:ext cx="0" cy="0"/>
-          <a:chOff x="0" y="0"/>
-          <a:chExt cx="0" cy="0"/>
-        </a:xfrm>
-      </p:grpSpPr>
-      <p:sp>
-        <p:nvSpPr>
-          <p:cNvPr id="80" name="Google Shape;80;p5"/>
-          <p:cNvSpPr txBox="1">
-            <a:spLocks noGrp="1"/>
-          </p:cNvSpPr>
-          <p:nvPr>
-            <p:ph type="title"/>
-          </p:nvPr>
-        </p:nvSpPr>
-        <p:spPr>
-          <a:xfrm>
-            <a:off x="311700" y="445025"/>
-            <a:ext cx="8520600" cy="572700"/>
-          </a:xfrm>
-          <a:prstGeom prst="rect">
-            <a:avLst/>
-          </a:prstGeom>
-          <a:noFill/>
-          <a:ln>
-            <a:noFill/>
-          </a:ln>
-        </p:spPr>
-        <p:txBody>
-          <a:bodyPr spcFirstLastPara="1" wrap="square" lIns="91425" tIns="91425" rIns="91425" bIns="91425" anchor="t" anchorCtr="0">
-            <a:normAutofit fontScale="90000"/>
-          </a:bodyPr>
-          <a:lstStyle/>
-          <a:p>
-            <a:pPr marL="0" lvl="0" indent="0" algn="l" rtl="0">
-              <a:lnSpc>
-                <a:spcPct val="100000"/>
-              </a:lnSpc>
-              <a:spcBef>
-                <a:spcPts val="0"/>
-              </a:spcBef>
-              <a:spcAft>
-                <a:spcPts val="0"/>
-              </a:spcAft>
-              <a:buSzPct val="111111"/>
-              <a:buNone/>
-            </a:pPr>
-            <a:r>
-              <a:rPr lang="en"/>
-              <a:t>Outbreak</a:t>
-            </a:r>
-            <a:endParaRPr/>
-          </a:p>
-        </p:txBody>
-      </p:sp>
-      <p:sp>
-        <p:nvSpPr>
-          <p:cNvPr id="81" name="Google Shape;81;p5"/>
-          <p:cNvSpPr txBox="1"/>
-          <p:nvPr/>
-        </p:nvSpPr>
-        <p:spPr>
-          <a:xfrm>
-            <a:off x="401900" y="927775"/>
-            <a:ext cx="8430300" cy="1560300"/>
-          </a:xfrm>
-          <a:prstGeom prst="rect">
-            <a:avLst/>
-          </a:prstGeom>
-          <a:noFill/>
-          <a:ln>
-            <a:noFill/>
-          </a:ln>
-        </p:spPr>
-        <p:txBody>
-          <a:bodyPr spcFirstLastPara="1" wrap="square" lIns="91425" tIns="91425" rIns="91425" bIns="91425" anchor="t" anchorCtr="0">
-            <a:spAutoFit/>
-          </a:bodyPr>
-          <a:lstStyle/>
-          <a:p>
-            <a:pPr marL="0" lvl="0" indent="0" algn="l" rtl="0">
-              <a:lnSpc>
-                <a:spcPct val="115000"/>
-              </a:lnSpc>
-              <a:spcBef>
-                <a:spcPts val="0"/>
-              </a:spcBef>
-              <a:spcAft>
-                <a:spcPts val="0"/>
-              </a:spcAft>
-              <a:buClr>
-                <a:schemeClr val="dk1"/>
-              </a:buClr>
-              <a:buSzPts val="1100"/>
-              <a:buFont typeface="Arial"/>
-              <a:buNone/>
-            </a:pPr>
-            <a:r>
-              <a:rPr lang="en" sz="1050" b="1">
-                <a:solidFill>
-                  <a:schemeClr val="dk1"/>
-                </a:solidFill>
-              </a:rPr>
-              <a:t>Mutations</a:t>
-            </a:r>
-            <a:r>
-              <a:rPr lang="en" sz="1050">
-                <a:solidFill>
-                  <a:schemeClr val="dk1"/>
-                </a:solidFill>
-              </a:rPr>
-              <a:t>: The virus may undergo an alteration in the nucleotide sequence of the genome during the disease outbreak</a:t>
-            </a:r>
-            <a:endParaRPr sz="1050">
-              <a:solidFill>
-                <a:schemeClr val="dk1"/>
-              </a:solidFill>
-            </a:endParaRPr>
-          </a:p>
-          <a:p>
-            <a:pPr marL="0" lvl="0" indent="0" algn="l" rtl="0">
-              <a:lnSpc>
-                <a:spcPct val="115000"/>
-              </a:lnSpc>
-              <a:spcBef>
-                <a:spcPts val="600"/>
-              </a:spcBef>
-              <a:spcAft>
-                <a:spcPts val="0"/>
-              </a:spcAft>
-              <a:buClr>
-                <a:schemeClr val="dk1"/>
-              </a:buClr>
-              <a:buSzPts val="1100"/>
-              <a:buFont typeface="Arial"/>
-              <a:buNone/>
-            </a:pPr>
-            <a:r>
-              <a:rPr lang="en" sz="1050" b="1">
-                <a:solidFill>
-                  <a:schemeClr val="dk1"/>
-                </a:solidFill>
-              </a:rPr>
-              <a:t>Infections</a:t>
-            </a:r>
-            <a:r>
-              <a:rPr lang="en" sz="1050">
-                <a:solidFill>
-                  <a:schemeClr val="dk1"/>
-                </a:solidFill>
-              </a:rPr>
-              <a:t>: Invasion of an organism's body tissues by disease-causing agents. People can be infected by the virus in the disease outbreak</a:t>
-            </a:r>
-            <a:endParaRPr sz="1050">
-              <a:solidFill>
-                <a:schemeClr val="dk1"/>
-              </a:solidFill>
-            </a:endParaRPr>
-          </a:p>
-          <a:p>
-            <a:pPr marL="0" lvl="0" indent="0" algn="l" rtl="0">
-              <a:lnSpc>
-                <a:spcPct val="115000"/>
-              </a:lnSpc>
-              <a:spcBef>
-                <a:spcPts val="600"/>
-              </a:spcBef>
-              <a:spcAft>
-                <a:spcPts val="0"/>
-              </a:spcAft>
-              <a:buClr>
-                <a:schemeClr val="dk1"/>
-              </a:buClr>
-              <a:buSzPts val="1100"/>
-              <a:buFont typeface="Arial"/>
-              <a:buNone/>
-            </a:pPr>
-            <a:r>
-              <a:rPr lang="en" sz="1050" b="1">
-                <a:solidFill>
-                  <a:schemeClr val="dk1"/>
-                </a:solidFill>
-              </a:rPr>
-              <a:t>Illness</a:t>
-            </a:r>
-            <a:r>
-              <a:rPr lang="en" sz="1050">
-                <a:solidFill>
-                  <a:schemeClr val="dk1"/>
-                </a:solidFill>
-              </a:rPr>
-              <a:t>: Abnormal condition that negatively affects the structure or function of all or part of an organism due to infection of the virus in the disease outbreak</a:t>
-            </a:r>
-            <a:endParaRPr sz="1050">
-              <a:solidFill>
-                <a:schemeClr val="dk1"/>
-              </a:solidFill>
-            </a:endParaRPr>
-          </a:p>
-          <a:p>
-            <a:pPr marL="0" lvl="0" indent="0" algn="l" rtl="0">
-              <a:lnSpc>
-                <a:spcPct val="115000"/>
-              </a:lnSpc>
-              <a:spcBef>
-                <a:spcPts val="600"/>
-              </a:spcBef>
-              <a:spcAft>
-                <a:spcPts val="0"/>
-              </a:spcAft>
-              <a:buClr>
-                <a:schemeClr val="dk1"/>
-              </a:buClr>
-              <a:buSzPts val="1100"/>
-              <a:buFont typeface="Arial"/>
-              <a:buNone/>
-            </a:pPr>
-            <a:r>
-              <a:rPr lang="en" sz="1050" b="1">
-                <a:solidFill>
-                  <a:schemeClr val="dk1"/>
-                </a:solidFill>
-              </a:rPr>
-              <a:t>Construction</a:t>
-            </a:r>
-            <a:r>
-              <a:rPr lang="en" sz="1050">
-                <a:solidFill>
-                  <a:schemeClr val="dk1"/>
-                </a:solidFill>
-              </a:rPr>
-              <a:t>: Field hospitals may be constructed to accommodate patients during the outbreak</a:t>
-            </a:r>
-            <a:endParaRPr sz="1050">
-              <a:solidFill>
-                <a:schemeClr val="dk1"/>
-              </a:solidFill>
-            </a:endParaRPr>
-          </a:p>
-          <a:p>
-            <a:pPr marL="0" lvl="0" indent="0" algn="l" rtl="0">
-              <a:spcBef>
-                <a:spcPts val="0"/>
-              </a:spcBef>
-              <a:spcAft>
-                <a:spcPts val="0"/>
-              </a:spcAft>
-              <a:buNone/>
-            </a:pPr>
-            <a:endParaRPr/>
-          </a:p>
-        </p:txBody>
-      </p:sp>
-      <p:pic>
-        <p:nvPicPr>
-          <p:cNvPr id="2" name="Picture 1">
-            <a:extLst>
-              <a:ext uri="{FF2B5EF4-FFF2-40B4-BE49-F238E27FC236}">
-                <a16:creationId xmlns:a16="http://schemas.microsoft.com/office/drawing/2014/main" id="{A2EE2800-0966-2F4E-9989-D33C2A8283BC}"/>
-              </a:ext>
-            </a:extLst>
-          </p:cNvPr>
-          <p:cNvPicPr>
-            <a:picLocks noChangeAspect="1"/>
-          </p:cNvPicPr>
-          <p:nvPr/>
-        </p:nvPicPr>
-        <p:blipFill>
-          <a:blip r:embed="rId3"/>
-          <a:stretch>
-            <a:fillRect/>
-          </a:stretch>
-        </p:blipFill>
-        <p:spPr>
-          <a:xfrm>
-            <a:off x="581763" y="2488075"/>
-            <a:ext cx="8070574" cy="2300535"/>
-          </a:xfrm>
-          <a:prstGeom prst="rect">
-            <a:avLst/>
-          </a:prstGeom>
-        </p:spPr>
-      </p:pic>
-    </p:spTree>
-  </p:cSld>
-  <p:clrMapOvr>
-    <a:masterClrMapping/>
-  </p:clrMapOvr>
-</p:sld>
-</file>
-
-<file path=ppt/slides/slide9.xml><?xml version="1.0" encoding="utf-8"?>
 <p:sld xmlns:a="http://schemas.openxmlformats.org/drawingml/2006/main" xmlns:r="http://schemas.openxmlformats.org/officeDocument/2006/relationships" xmlns:p="http://schemas.openxmlformats.org/presentationml/2006/main">
   <p:cSld>
     <p:spTree>
@@ -14674,6 +14009,426 @@
           </a:prstGeom>
         </p:spPr>
       </p:pic>
+    </p:spTree>
+  </p:cSld>
+  <p:clrMapOvr>
+    <a:masterClrMapping/>
+  </p:clrMapOvr>
+</p:sld>
+</file>
+
+<file path=ppt/slides/slide9.xml><?xml version="1.0" encoding="utf-8"?>
+<p:sld xmlns:a="http://schemas.openxmlformats.org/drawingml/2006/main" xmlns:r="http://schemas.openxmlformats.org/officeDocument/2006/relationships" xmlns:p="http://schemas.openxmlformats.org/presentationml/2006/main">
+  <p:cSld>
+    <p:spTree>
+      <p:nvGrpSpPr>
+        <p:cNvPr id="1" name="Shape 101"/>
+        <p:cNvGrpSpPr/>
+        <p:nvPr/>
+      </p:nvGrpSpPr>
+      <p:grpSpPr>
+        <a:xfrm>
+          <a:off x="0" y="0"/>
+          <a:ext cx="0" cy="0"/>
+          <a:chOff x="0" y="0"/>
+          <a:chExt cx="0" cy="0"/>
+        </a:xfrm>
+      </p:grpSpPr>
+      <p:pic>
+        <p:nvPicPr>
+          <p:cNvPr id="3" name="Picture 2">
+            <a:extLst>
+              <a:ext uri="{FF2B5EF4-FFF2-40B4-BE49-F238E27FC236}">
+                <a16:creationId xmlns:a16="http://schemas.microsoft.com/office/drawing/2014/main" id="{DC14A976-3EA1-ACB4-AF03-82A9A1F5770E}"/>
+              </a:ext>
+            </a:extLst>
+          </p:cNvPr>
+          <p:cNvPicPr>
+            <a:picLocks noChangeAspect="1"/>
+          </p:cNvPicPr>
+          <p:nvPr/>
+        </p:nvPicPr>
+        <p:blipFill>
+          <a:blip r:embed="rId3"/>
+          <a:stretch>
+            <a:fillRect/>
+          </a:stretch>
+        </p:blipFill>
+        <p:spPr>
+          <a:xfrm>
+            <a:off x="694365" y="2339270"/>
+            <a:ext cx="7755270" cy="2738402"/>
+          </a:xfrm>
+          <a:prstGeom prst="rect">
+            <a:avLst/>
+          </a:prstGeom>
+        </p:spPr>
+      </p:pic>
+      <p:sp>
+        <p:nvSpPr>
+          <p:cNvPr id="102" name="Google Shape;102;p8"/>
+          <p:cNvSpPr txBox="1">
+            <a:spLocks noGrp="1"/>
+          </p:cNvSpPr>
+          <p:nvPr>
+            <p:ph type="title"/>
+          </p:nvPr>
+        </p:nvSpPr>
+        <p:spPr>
+          <a:xfrm>
+            <a:off x="139325" y="0"/>
+            <a:ext cx="8520600" cy="572700"/>
+          </a:xfrm>
+          <a:prstGeom prst="rect">
+            <a:avLst/>
+          </a:prstGeom>
+          <a:noFill/>
+          <a:ln>
+            <a:noFill/>
+          </a:ln>
+        </p:spPr>
+        <p:txBody>
+          <a:bodyPr spcFirstLastPara="1" wrap="square" lIns="91425" tIns="91425" rIns="91425" bIns="91425" anchor="t" anchorCtr="0">
+            <a:normAutofit fontScale="90000"/>
+          </a:bodyPr>
+          <a:lstStyle/>
+          <a:p>
+            <a:pPr marL="0" lvl="0" indent="0" algn="l" rtl="0">
+              <a:lnSpc>
+                <a:spcPct val="100000"/>
+              </a:lnSpc>
+              <a:spcBef>
+                <a:spcPts val="0"/>
+              </a:spcBef>
+              <a:spcAft>
+                <a:spcPts val="0"/>
+              </a:spcAft>
+              <a:buSzPct val="111111"/>
+              <a:buNone/>
+            </a:pPr>
+            <a:r>
+              <a:rPr lang="en" dirty="0"/>
+              <a:t>Authority Response</a:t>
+            </a:r>
+            <a:endParaRPr dirty="0"/>
+          </a:p>
+        </p:txBody>
+      </p:sp>
+      <p:sp>
+        <p:nvSpPr>
+          <p:cNvPr id="104" name="Google Shape;104;p8"/>
+          <p:cNvSpPr txBox="1"/>
+          <p:nvPr/>
+        </p:nvSpPr>
+        <p:spPr>
+          <a:xfrm>
+            <a:off x="139325" y="465635"/>
+            <a:ext cx="8774185" cy="1962045"/>
+          </a:xfrm>
+          <a:prstGeom prst="rect">
+            <a:avLst/>
+          </a:prstGeom>
+          <a:noFill/>
+          <a:ln>
+            <a:noFill/>
+          </a:ln>
+        </p:spPr>
+        <p:txBody>
+          <a:bodyPr spcFirstLastPara="1" wrap="square" lIns="91425" tIns="91425" rIns="91425" bIns="91425" anchor="t" anchorCtr="0">
+            <a:spAutoFit/>
+          </a:bodyPr>
+          <a:lstStyle/>
+          <a:p>
+            <a:pPr marL="0" lvl="0" indent="0" algn="l" rtl="0">
+              <a:spcBef>
+                <a:spcPts val="0"/>
+              </a:spcBef>
+              <a:spcAft>
+                <a:spcPts val="0"/>
+              </a:spcAft>
+              <a:buClr>
+                <a:schemeClr val="dk1"/>
+              </a:buClr>
+              <a:buSzPts val="1100"/>
+              <a:buFont typeface="Arial"/>
+              <a:buNone/>
+            </a:pPr>
+            <a:r>
+              <a:rPr lang="en" sz="1050" b="1" dirty="0">
+                <a:solidFill>
+                  <a:schemeClr val="dk1"/>
+                </a:solidFill>
+              </a:rPr>
+              <a:t>Assignment</a:t>
+            </a:r>
+            <a:r>
+              <a:rPr lang="en" sz="1050" dirty="0">
+                <a:solidFill>
+                  <a:schemeClr val="dk1"/>
+                </a:solidFill>
+              </a:rPr>
+              <a:t>: Officials are assigned to monitor, prevent, contain, and mitigate the disease outbreak</a:t>
+            </a:r>
+          </a:p>
+          <a:p>
+            <a:pPr marL="0" lvl="0" indent="0" algn="l" rtl="0">
+              <a:spcBef>
+                <a:spcPts val="0"/>
+              </a:spcBef>
+              <a:spcAft>
+                <a:spcPts val="0"/>
+              </a:spcAft>
+              <a:buClr>
+                <a:schemeClr val="dk1"/>
+              </a:buClr>
+              <a:buSzPts val="1100"/>
+              <a:buFont typeface="Arial"/>
+              <a:buNone/>
+            </a:pPr>
+            <a:r>
+              <a:rPr lang="en" sz="1050" b="1" dirty="0">
+                <a:solidFill>
+                  <a:schemeClr val="dk1"/>
+                </a:solidFill>
+              </a:rPr>
+              <a:t>Inspection: </a:t>
+            </a:r>
+            <a:r>
+              <a:rPr lang="en" sz="1050" dirty="0">
+                <a:solidFill>
+                  <a:schemeClr val="dk1"/>
+                </a:solidFill>
+              </a:rPr>
+              <a:t>Officials inspect the source of the disease to devise countermeasures</a:t>
+            </a:r>
+          </a:p>
+          <a:p>
+            <a:pPr>
+              <a:buClr>
+                <a:schemeClr val="dk1"/>
+              </a:buClr>
+              <a:buSzPts val="1100"/>
+            </a:pPr>
+            <a:r>
+              <a:rPr lang="en" sz="1050" b="1" dirty="0">
+                <a:solidFill>
+                  <a:schemeClr val="dk1"/>
+                </a:solidFill>
+              </a:rPr>
+              <a:t>Destruction</a:t>
+            </a:r>
+            <a:r>
+              <a:rPr lang="en" sz="1050" dirty="0">
+                <a:solidFill>
+                  <a:schemeClr val="dk1"/>
+                </a:solidFill>
+              </a:rPr>
+              <a:t>: </a:t>
+            </a:r>
+            <a:r>
+              <a:rPr lang="en-US" sz="1050" dirty="0">
+                <a:solidFill>
+                  <a:schemeClr val="dk1"/>
+                </a:solidFill>
+              </a:rPr>
+              <a:t>Government destroys the source of the disease, for example, Haiti demolished the fishing nuts where the Cholera epidemic started.</a:t>
+            </a:r>
+          </a:p>
+          <a:p>
+            <a:pPr>
+              <a:buClr>
+                <a:schemeClr val="dk1"/>
+              </a:buClr>
+              <a:buSzPts val="1100"/>
+            </a:pPr>
+            <a:r>
+              <a:rPr lang="en" sz="1050" b="1" dirty="0">
+                <a:solidFill>
+                  <a:schemeClr val="dk1"/>
+                </a:solidFill>
+              </a:rPr>
+              <a:t>Gov Health Decree</a:t>
+            </a:r>
+            <a:r>
+              <a:rPr lang="en" sz="1050" dirty="0">
+                <a:solidFill>
+                  <a:schemeClr val="dk1"/>
+                </a:solidFill>
+              </a:rPr>
+              <a:t>: Legislations were issued fighting the disease outbreak by government</a:t>
+            </a:r>
+          </a:p>
+          <a:p>
+            <a:pPr>
+              <a:buClr>
+                <a:schemeClr val="dk1"/>
+              </a:buClr>
+              <a:buSzPts val="1100"/>
+            </a:pPr>
+            <a:r>
+              <a:rPr lang="en" sz="1050" b="1" dirty="0">
+                <a:solidFill>
+                  <a:schemeClr val="dk1"/>
+                </a:solidFill>
+              </a:rPr>
+              <a:t>Information Campaign</a:t>
+            </a:r>
+            <a:r>
+              <a:rPr lang="en" sz="1050" dirty="0">
+                <a:solidFill>
+                  <a:schemeClr val="dk1"/>
+                </a:solidFill>
+              </a:rPr>
+              <a:t>: Use of media to inform public about the disease</a:t>
+            </a:r>
+          </a:p>
+          <a:p>
+            <a:pPr>
+              <a:buClr>
+                <a:schemeClr val="dk1"/>
+              </a:buClr>
+              <a:buSzPts val="1100"/>
+            </a:pPr>
+            <a:r>
+              <a:rPr lang="en" sz="1050" b="1" dirty="0">
+                <a:solidFill>
+                  <a:schemeClr val="dk1"/>
+                </a:solidFill>
+              </a:rPr>
+              <a:t>Debunk Misinformation</a:t>
+            </a:r>
+            <a:r>
+              <a:rPr lang="en" sz="1050" dirty="0">
+                <a:solidFill>
+                  <a:schemeClr val="dk1"/>
+                </a:solidFill>
+              </a:rPr>
+              <a:t>: Debunking misinformation of related to the disease outbreak</a:t>
+            </a:r>
+          </a:p>
+          <a:p>
+            <a:pPr>
+              <a:buClr>
+                <a:schemeClr val="dk1"/>
+              </a:buClr>
+              <a:buSzPts val="1100"/>
+            </a:pPr>
+            <a:r>
+              <a:rPr lang="en" sz="1050" b="1" dirty="0">
+                <a:solidFill>
+                  <a:schemeClr val="dk1"/>
+                </a:solidFill>
+              </a:rPr>
+              <a:t>Close Border</a:t>
+            </a:r>
+            <a:r>
+              <a:rPr lang="en" sz="1050" dirty="0">
+                <a:solidFill>
+                  <a:schemeClr val="dk1"/>
+                </a:solidFill>
+              </a:rPr>
+              <a:t>: Border were closed to slow the spread of the virus</a:t>
+            </a:r>
+          </a:p>
+          <a:p>
+            <a:pPr>
+              <a:buClr>
+                <a:schemeClr val="dk1"/>
+              </a:buClr>
+              <a:buSzPts val="1100"/>
+            </a:pPr>
+            <a:r>
+              <a:rPr lang="en" sz="1050" b="1" dirty="0">
+                <a:solidFill>
+                  <a:schemeClr val="dk1"/>
+                </a:solidFill>
+              </a:rPr>
+              <a:t>Distribute</a:t>
+            </a:r>
+            <a:r>
+              <a:rPr lang="en" sz="1050" dirty="0">
+                <a:solidFill>
+                  <a:schemeClr val="dk1"/>
+                </a:solidFill>
+              </a:rPr>
+              <a:t>: Distributing the vaccines of the virus</a:t>
+            </a:r>
+          </a:p>
+          <a:p>
+            <a:pPr>
+              <a:buClr>
+                <a:schemeClr val="dk1"/>
+              </a:buClr>
+              <a:buSzPts val="1100"/>
+            </a:pPr>
+            <a:r>
+              <a:rPr lang="en" sz="1050" b="1" dirty="0">
+                <a:solidFill>
+                  <a:schemeClr val="dk1"/>
+                </a:solidFill>
+              </a:rPr>
+              <a:t>Financial Aid</a:t>
+            </a:r>
+            <a:r>
+              <a:rPr lang="en" sz="1050" dirty="0">
+                <a:solidFill>
+                  <a:schemeClr val="dk1"/>
+                </a:solidFill>
+              </a:rPr>
+              <a:t>: Financial assistance with food, housing and bills</a:t>
+            </a:r>
+          </a:p>
+          <a:p>
+            <a:pPr>
+              <a:buClr>
+                <a:schemeClr val="dk1"/>
+              </a:buClr>
+              <a:buSzPts val="1100"/>
+            </a:pPr>
+            <a:r>
+              <a:rPr lang="en" sz="1050" b="1" dirty="0" err="1">
+                <a:solidFill>
+                  <a:schemeClr val="dk1"/>
+                </a:solidFill>
+              </a:rPr>
+              <a:t>ExchangeBuySell</a:t>
+            </a:r>
+            <a:r>
+              <a:rPr lang="en" sz="1050" dirty="0">
+                <a:solidFill>
+                  <a:schemeClr val="dk1"/>
+                </a:solidFill>
+              </a:rPr>
+              <a:t>: Buying, selling or exchanging goods related to the disease outbreak</a:t>
+            </a:r>
+          </a:p>
+          <a:p>
+            <a:pPr>
+              <a:buClr>
+                <a:schemeClr val="dk1"/>
+              </a:buClr>
+              <a:buSzPts val="1100"/>
+            </a:pPr>
+            <a:r>
+              <a:rPr lang="en" sz="1050" b="1" dirty="0">
+                <a:solidFill>
+                  <a:schemeClr val="dk1"/>
+                </a:solidFill>
+              </a:rPr>
+              <a:t>Donate</a:t>
+            </a:r>
+            <a:r>
+              <a:rPr lang="en" sz="1050" dirty="0">
+                <a:solidFill>
+                  <a:schemeClr val="dk1"/>
+                </a:solidFill>
+              </a:rPr>
+              <a:t>: Charitable activities related to the disease outbreak</a:t>
+            </a:r>
+            <a:endParaRPr dirty="0"/>
+          </a:p>
+        </p:txBody>
+      </p:sp>
     </p:spTree>
   </p:cSld>
   <p:clrMapOvr>

</xml_diff>